<commit_message>
update lectures 08, log-odds
</commit_message>
<xml_diff>
--- a/docs/lectures/Log-Odds.pptx
+++ b/docs/lectures/Log-Odds.pptx
@@ -5,7 +5,7 @@
     <p:sldMasterId id="2147483660" r:id="rId1"/>
   </p:sldMasterIdLst>
   <p:handoutMasterIdLst>
-    <p:handoutMasterId r:id="rId50"/>
+    <p:handoutMasterId r:id="rId56"/>
   </p:handoutMasterIdLst>
   <p:sldIdLst>
     <p:sldId id="256" r:id="rId2"/>
@@ -47,15 +47,21 @@
     <p:sldId id="293" r:id="rId38"/>
     <p:sldId id="294" r:id="rId39"/>
     <p:sldId id="295" r:id="rId40"/>
-    <p:sldId id="296" r:id="rId41"/>
-    <p:sldId id="297" r:id="rId42"/>
-    <p:sldId id="298" r:id="rId43"/>
-    <p:sldId id="299" r:id="rId44"/>
-    <p:sldId id="300" r:id="rId45"/>
-    <p:sldId id="301" r:id="rId46"/>
-    <p:sldId id="302" r:id="rId47"/>
-    <p:sldId id="303" r:id="rId48"/>
-    <p:sldId id="304" r:id="rId49"/>
+    <p:sldId id="306" r:id="rId41"/>
+    <p:sldId id="296" r:id="rId42"/>
+    <p:sldId id="297" r:id="rId43"/>
+    <p:sldId id="298" r:id="rId44"/>
+    <p:sldId id="307" r:id="rId45"/>
+    <p:sldId id="308" r:id="rId46"/>
+    <p:sldId id="309" r:id="rId47"/>
+    <p:sldId id="311" r:id="rId48"/>
+    <p:sldId id="299" r:id="rId49"/>
+    <p:sldId id="300" r:id="rId50"/>
+    <p:sldId id="301" r:id="rId51"/>
+    <p:sldId id="302" r:id="rId52"/>
+    <p:sldId id="303" r:id="rId53"/>
+    <p:sldId id="304" r:id="rId54"/>
+    <p:sldId id="310" r:id="rId55"/>
   </p:sldIdLst>
   <p:sldSz cx="9144000" cy="6858000" type="screen4x3"/>
   <p:notesSz cx="6858000" cy="9144000"/>
@@ -210,15 +216,21 @@
             <p14:sldId id="293"/>
             <p14:sldId id="294"/>
             <p14:sldId id="295"/>
+            <p14:sldId id="306"/>
             <p14:sldId id="296"/>
             <p14:sldId id="297"/>
             <p14:sldId id="298"/>
+            <p14:sldId id="307"/>
+            <p14:sldId id="308"/>
+            <p14:sldId id="309"/>
+            <p14:sldId id="311"/>
             <p14:sldId id="299"/>
             <p14:sldId id="300"/>
             <p14:sldId id="301"/>
             <p14:sldId id="302"/>
             <p14:sldId id="303"/>
             <p14:sldId id="304"/>
+            <p14:sldId id="310"/>
           </p14:sldIdLst>
         </p14:section>
       </p14:sectionLst>
@@ -337,7 +349,7 @@
           <a:p>
             <a:fld id="{08BD4FA9-F3CE-45B3-A980-C331C6F1EF65}" type="datetimeFigureOut">
               <a:rPr lang="en-US" smtClean="0"/>
-              <a:t>3/9/2023</a:t>
+              <a:t>3/17/2023</a:t>
             </a:fld>
             <a:endParaRPr lang="en-US"/>
           </a:p>
@@ -610,7 +622,7 @@
           <a:p>
             <a:fld id="{EAAD3657-2200-4D14-82C0-10C39B0F0F06}" type="datetime1">
               <a:rPr lang="en-US" smtClean="0"/>
-              <a:t>3/9/2023</a:t>
+              <a:t>3/17/2023</a:t>
             </a:fld>
             <a:endParaRPr lang="en-US"/>
           </a:p>
@@ -778,7 +790,7 @@
           <a:p>
             <a:fld id="{11BBAF55-A85E-4993-914E-FC1E5AA7DF24}" type="datetime1">
               <a:rPr lang="en-US" smtClean="0"/>
-              <a:t>3/9/2023</a:t>
+              <a:t>3/17/2023</a:t>
             </a:fld>
             <a:endParaRPr lang="en-US"/>
           </a:p>
@@ -956,7 +968,7 @@
           <a:p>
             <a:fld id="{39816E07-E1DB-44A4-A5E5-9F4B54E8C933}" type="datetime1">
               <a:rPr lang="en-US" smtClean="0"/>
-              <a:t>3/9/2023</a:t>
+              <a:t>3/17/2023</a:t>
             </a:fld>
             <a:endParaRPr lang="en-US"/>
           </a:p>
@@ -1141,7 +1153,7 @@
           <a:p>
             <a:fld id="{C2B1AD17-B813-4477-8AFE-B1860CC59113}" type="datetime1">
               <a:rPr lang="en-US" smtClean="0"/>
-              <a:t>3/9/2023</a:t>
+              <a:t>3/17/2023</a:t>
             </a:fld>
             <a:endParaRPr lang="en-US"/>
           </a:p>
@@ -1386,7 +1398,7 @@
           <a:p>
             <a:fld id="{D0975C0D-5C9E-48CC-8D31-F42D19FA8F7A}" type="datetime1">
               <a:rPr lang="en-US" smtClean="0"/>
-              <a:t>3/9/2023</a:t>
+              <a:t>3/17/2023</a:t>
             </a:fld>
             <a:endParaRPr lang="en-US"/>
           </a:p>
@@ -1671,7 +1683,7 @@
           <a:p>
             <a:fld id="{28657551-0F2B-4F09-86FD-F7994CE83DC5}" type="datetime1">
               <a:rPr lang="en-US" smtClean="0"/>
-              <a:t>3/9/2023</a:t>
+              <a:t>3/17/2023</a:t>
             </a:fld>
             <a:endParaRPr lang="en-US"/>
           </a:p>
@@ -2090,7 +2102,7 @@
           <a:p>
             <a:fld id="{3929D2B2-4200-46B9-96C3-02A55D5FAA00}" type="datetime1">
               <a:rPr lang="en-US" smtClean="0"/>
-              <a:t>3/9/2023</a:t>
+              <a:t>3/17/2023</a:t>
             </a:fld>
             <a:endParaRPr lang="en-US"/>
           </a:p>
@@ -2207,7 +2219,7 @@
           <a:p>
             <a:fld id="{41FF7722-74E8-497F-A072-89677A2C2373}" type="datetime1">
               <a:rPr lang="en-US" smtClean="0"/>
-              <a:t>3/9/2023</a:t>
+              <a:t>3/17/2023</a:t>
             </a:fld>
             <a:endParaRPr lang="en-US"/>
           </a:p>
@@ -2302,7 +2314,7 @@
           <a:p>
             <a:fld id="{BD26212E-B46B-426F-AE59-AA326827D9E0}" type="datetime1">
               <a:rPr lang="en-US" smtClean="0"/>
-              <a:t>3/9/2023</a:t>
+              <a:t>3/17/2023</a:t>
             </a:fld>
             <a:endParaRPr lang="en-US"/>
           </a:p>
@@ -2577,7 +2589,7 @@
           <a:p>
             <a:fld id="{FB9B81E8-09EA-4684-A39F-38DE1E49D20C}" type="datetime1">
               <a:rPr lang="en-US" smtClean="0"/>
-              <a:t>3/9/2023</a:t>
+              <a:t>3/17/2023</a:t>
             </a:fld>
             <a:endParaRPr lang="en-US"/>
           </a:p>
@@ -2829,7 +2841,7 @@
           <a:p>
             <a:fld id="{35C5CC5F-056C-4047-9A5C-9F5B4BED129B}" type="datetime1">
               <a:rPr lang="en-US" smtClean="0"/>
-              <a:t>3/9/2023</a:t>
+              <a:t>3/17/2023</a:t>
             </a:fld>
             <a:endParaRPr lang="en-US"/>
           </a:p>
@@ -3043,7 +3055,7 @@
           <a:p>
             <a:fld id="{E8171053-07BD-4A17-AC24-0A22EAA36098}" type="datetime1">
               <a:rPr lang="en-US" smtClean="0"/>
-              <a:t>3/9/2023</a:t>
+              <a:t>3/17/2023</a:t>
             </a:fld>
             <a:endParaRPr lang="en-US"/>
           </a:p>
@@ -12029,7 +12041,7 @@
           <p:cNvPr id="2" name="Title 1">
             <a:extLst>
               <a:ext uri="{FF2B5EF4-FFF2-40B4-BE49-F238E27FC236}">
-                <a16:creationId xmlns:a16="http://schemas.microsoft.com/office/drawing/2014/main" id="{09D72CF6-1A4E-1ACE-0A8F-90CD70F06062}"/>
+                <a16:creationId xmlns:a16="http://schemas.microsoft.com/office/drawing/2014/main" id="{D139FA0C-F38F-576E-483D-FA47E1EBB8E7}"/>
               </a:ext>
             </a:extLst>
           </p:cNvPr>
@@ -12043,13 +12055,13 @@
         <p:spPr/>
         <p:txBody>
           <a:bodyPr>
-            <a:normAutofit/>
+            <a:normAutofit fontScale="90000"/>
           </a:bodyPr>
           <a:lstStyle/>
           <a:p>
             <a:r>
-              <a:rPr lang="en-CA" sz="3200" dirty="0"/>
-              <a:t>Linear model for log odds and log odds ratios</a:t>
+              <a:rPr lang="en-CA" dirty="0"/>
+              <a:t>Calculating…</a:t>
             </a:r>
           </a:p>
         </p:txBody>
@@ -12059,7 +12071,7 @@
           <p:cNvPr id="3" name="Slide Number Placeholder 2">
             <a:extLst>
               <a:ext uri="{FF2B5EF4-FFF2-40B4-BE49-F238E27FC236}">
-                <a16:creationId xmlns:a16="http://schemas.microsoft.com/office/drawing/2014/main" id="{03342D3D-5E22-FBB3-FC53-2E485B19119D}"/>
+                <a16:creationId xmlns:a16="http://schemas.microsoft.com/office/drawing/2014/main" id="{A832CDFA-313D-A62E-0204-D5BA7FEA5D14}"/>
               </a:ext>
             </a:extLst>
           </p:cNvPr>
@@ -12083,42 +12095,239 @@
           </a:p>
         </p:txBody>
       </p:sp>
-      <p:pic>
-        <p:nvPicPr>
-          <p:cNvPr id="5" name="Picture 4">
-            <a:extLst>
-              <a:ext uri="{FF2B5EF4-FFF2-40B4-BE49-F238E27FC236}">
-                <a16:creationId xmlns:a16="http://schemas.microsoft.com/office/drawing/2014/main" id="{BB72F882-678B-F214-250C-5CFEABBEC268}"/>
-              </a:ext>
-            </a:extLst>
-          </p:cNvPr>
-          <p:cNvPicPr>
-            <a:picLocks noChangeAspect="1"/>
-          </p:cNvPicPr>
+      <p:sp>
+        <p:nvSpPr>
+          <p:cNvPr id="4" name="TextBox 3">
+            <a:extLst>
+              <a:ext uri="{FF2B5EF4-FFF2-40B4-BE49-F238E27FC236}">
+                <a16:creationId xmlns:a16="http://schemas.microsoft.com/office/drawing/2014/main" id="{7C0E9332-31E1-7D1B-C75D-4049297B597D}"/>
+              </a:ext>
+            </a:extLst>
+          </p:cNvPr>
+          <p:cNvSpPr txBox="1"/>
           <p:nvPr/>
-        </p:nvPicPr>
-        <p:blipFill>
-          <a:blip r:embed="rId2"/>
-          <a:stretch>
-            <a:fillRect/>
-          </a:stretch>
-        </p:blipFill>
+        </p:nvSpPr>
         <p:spPr>
           <a:xfrm>
-            <a:off x="486286" y="1562695"/>
-            <a:ext cx="8171428" cy="4761905"/>
+            <a:off x="457200" y="1577876"/>
+            <a:ext cx="8229600" cy="1815882"/>
           </a:xfrm>
           <a:prstGeom prst="rect">
             <a:avLst/>
           </a:prstGeom>
+          <a:solidFill>
+            <a:schemeClr val="accent6">
+              <a:lumMod val="20000"/>
+              <a:lumOff val="80000"/>
+              <a:alpha val="60000"/>
+            </a:schemeClr>
+          </a:solidFill>
         </p:spPr>
-      </p:pic>
-      <p:sp>
-        <p:nvSpPr>
-          <p:cNvPr id="6" name="TextBox 5">
-            <a:extLst>
-              <a:ext uri="{FF2B5EF4-FFF2-40B4-BE49-F238E27FC236}">
-                <a16:creationId xmlns:a16="http://schemas.microsoft.com/office/drawing/2014/main" id="{A4530166-87A4-1D76-5DD6-9E048BECFD15}"/>
+        <p:txBody>
+          <a:bodyPr wrap="square" rtlCol="0">
+            <a:spAutoFit/>
+          </a:bodyPr>
+          <a:lstStyle/>
+          <a:p>
+            <a:r>
+              <a:rPr lang="en-CA" sz="1400" dirty="0">
+                <a:latin typeface="Courier New" panose="02070309020205020404" pitchFamily="49" charset="0"/>
+                <a:cs typeface="Courier New" panose="02070309020205020404" pitchFamily="49" charset="0"/>
+              </a:rPr>
+              <a:t>data(coalminers, package = "VGAM")</a:t>
+            </a:r>
+          </a:p>
+          <a:p>
+            <a:r>
+              <a:rPr lang="en-CA" sz="1400" dirty="0">
+                <a:latin typeface="Courier New" panose="02070309020205020404" pitchFamily="49" charset="0"/>
+                <a:cs typeface="Courier New" panose="02070309020205020404" pitchFamily="49" charset="0"/>
+              </a:rPr>
+              <a:t>coalminers &lt;- transform(coalminers, Age = (age - 42) / 5)</a:t>
+            </a:r>
+          </a:p>
+          <a:p>
+            <a:endParaRPr lang="en-CA" sz="1400" dirty="0">
+              <a:latin typeface="Courier New" panose="02070309020205020404" pitchFamily="49" charset="0"/>
+              <a:cs typeface="Courier New" panose="02070309020205020404" pitchFamily="49" charset="0"/>
+            </a:endParaRPr>
+          </a:p>
+          <a:p>
+            <a:r>
+              <a:rPr lang="en-CA" sz="1400" dirty="0" err="1">
+                <a:latin typeface="Courier New" panose="02070309020205020404" pitchFamily="49" charset="0"/>
+                <a:cs typeface="Courier New" panose="02070309020205020404" pitchFamily="49" charset="0"/>
+              </a:rPr>
+              <a:t>logitsCM</a:t>
+            </a:r>
+            <a:r>
+              <a:rPr lang="en-CA" sz="1400" dirty="0">
+                <a:latin typeface="Courier New" panose="02070309020205020404" pitchFamily="49" charset="0"/>
+                <a:cs typeface="Courier New" panose="02070309020205020404" pitchFamily="49" charset="0"/>
+              </a:rPr>
+              <a:t> &lt;- </a:t>
+            </a:r>
+            <a:r>
+              <a:rPr lang="en-CA" sz="1400" dirty="0" err="1">
+                <a:latin typeface="Courier New" panose="02070309020205020404" pitchFamily="49" charset="0"/>
+                <a:cs typeface="Courier New" panose="02070309020205020404" pitchFamily="49" charset="0"/>
+              </a:rPr>
+              <a:t>vcdExtra</a:t>
+            </a:r>
+            <a:r>
+              <a:rPr lang="en-CA" sz="1400" dirty="0">
+                <a:latin typeface="Courier New" panose="02070309020205020404" pitchFamily="49" charset="0"/>
+                <a:cs typeface="Courier New" panose="02070309020205020404" pitchFamily="49" charset="0"/>
+              </a:rPr>
+              <a:t>::</a:t>
+            </a:r>
+            <a:r>
+              <a:rPr lang="en-CA" sz="1400" dirty="0" err="1">
+                <a:latin typeface="Courier New" panose="02070309020205020404" pitchFamily="49" charset="0"/>
+                <a:cs typeface="Courier New" panose="02070309020205020404" pitchFamily="49" charset="0"/>
+              </a:rPr>
+              <a:t>blogits</a:t>
+            </a:r>
+            <a:r>
+              <a:rPr lang="en-CA" sz="1400" dirty="0">
+                <a:latin typeface="Courier New" panose="02070309020205020404" pitchFamily="49" charset="0"/>
+                <a:cs typeface="Courier New" panose="02070309020205020404" pitchFamily="49" charset="0"/>
+              </a:rPr>
+              <a:t>(coalminers[, 1:4], add = 0.5)</a:t>
+            </a:r>
+          </a:p>
+          <a:p>
+            <a:r>
+              <a:rPr lang="en-CA" sz="1400" dirty="0" err="1">
+                <a:latin typeface="Courier New" panose="02070309020205020404" pitchFamily="49" charset="0"/>
+                <a:cs typeface="Courier New" panose="02070309020205020404" pitchFamily="49" charset="0"/>
+              </a:rPr>
+              <a:t>colnames</a:t>
+            </a:r>
+            <a:r>
+              <a:rPr lang="en-CA" sz="1400" dirty="0">
+                <a:latin typeface="Courier New" panose="02070309020205020404" pitchFamily="49" charset="0"/>
+                <a:cs typeface="Courier New" panose="02070309020205020404" pitchFamily="49" charset="0"/>
+              </a:rPr>
+              <a:t>(</a:t>
+            </a:r>
+            <a:r>
+              <a:rPr lang="en-CA" sz="1400" dirty="0" err="1">
+                <a:latin typeface="Courier New" panose="02070309020205020404" pitchFamily="49" charset="0"/>
+                <a:cs typeface="Courier New" panose="02070309020205020404" pitchFamily="49" charset="0"/>
+              </a:rPr>
+              <a:t>logitsCM</a:t>
+            </a:r>
+            <a:r>
+              <a:rPr lang="en-CA" sz="1400" dirty="0">
+                <a:latin typeface="Courier New" panose="02070309020205020404" pitchFamily="49" charset="0"/>
+                <a:cs typeface="Courier New" panose="02070309020205020404" pitchFamily="49" charset="0"/>
+              </a:rPr>
+              <a:t>)[1:2] &lt;- c("</a:t>
+            </a:r>
+            <a:r>
+              <a:rPr lang="en-CA" sz="1400" dirty="0" err="1">
+                <a:latin typeface="Courier New" panose="02070309020205020404" pitchFamily="49" charset="0"/>
+                <a:cs typeface="Courier New" panose="02070309020205020404" pitchFamily="49" charset="0"/>
+              </a:rPr>
+              <a:t>logitB</a:t>
+            </a:r>
+            <a:r>
+              <a:rPr lang="en-CA" sz="1400" dirty="0">
+                <a:latin typeface="Courier New" panose="02070309020205020404" pitchFamily="49" charset="0"/>
+                <a:cs typeface="Courier New" panose="02070309020205020404" pitchFamily="49" charset="0"/>
+              </a:rPr>
+              <a:t>", "</a:t>
+            </a:r>
+            <a:r>
+              <a:rPr lang="en-CA" sz="1400" dirty="0" err="1">
+                <a:latin typeface="Courier New" panose="02070309020205020404" pitchFamily="49" charset="0"/>
+                <a:cs typeface="Courier New" panose="02070309020205020404" pitchFamily="49" charset="0"/>
+              </a:rPr>
+              <a:t>logitW</a:t>
+            </a:r>
+            <a:r>
+              <a:rPr lang="en-CA" sz="1400" dirty="0">
+                <a:latin typeface="Courier New" panose="02070309020205020404" pitchFamily="49" charset="0"/>
+                <a:cs typeface="Courier New" panose="02070309020205020404" pitchFamily="49" charset="0"/>
+              </a:rPr>
+              <a:t>")</a:t>
+            </a:r>
+          </a:p>
+          <a:p>
+            <a:r>
+              <a:rPr lang="en-CA" sz="1400" dirty="0" err="1">
+                <a:latin typeface="Courier New" panose="02070309020205020404" pitchFamily="49" charset="0"/>
+                <a:cs typeface="Courier New" panose="02070309020205020404" pitchFamily="49" charset="0"/>
+              </a:rPr>
+              <a:t>logitsCM</a:t>
+            </a:r>
+            <a:r>
+              <a:rPr lang="en-CA" sz="1400" dirty="0">
+                <a:latin typeface="Courier New" panose="02070309020205020404" pitchFamily="49" charset="0"/>
+                <a:cs typeface="Courier New" panose="02070309020205020404" pitchFamily="49" charset="0"/>
+              </a:rPr>
+              <a:t> &lt;- </a:t>
+            </a:r>
+            <a:r>
+              <a:rPr lang="en-CA" sz="1400" dirty="0" err="1">
+                <a:latin typeface="Courier New" panose="02070309020205020404" pitchFamily="49" charset="0"/>
+                <a:cs typeface="Courier New" panose="02070309020205020404" pitchFamily="49" charset="0"/>
+              </a:rPr>
+              <a:t>cbind</a:t>
+            </a:r>
+            <a:r>
+              <a:rPr lang="en-CA" sz="1400" dirty="0">
+                <a:latin typeface="Courier New" panose="02070309020205020404" pitchFamily="49" charset="0"/>
+                <a:cs typeface="Courier New" panose="02070309020205020404" pitchFamily="49" charset="0"/>
+              </a:rPr>
+              <a:t>(</a:t>
+            </a:r>
+            <a:r>
+              <a:rPr lang="en-CA" sz="1400" dirty="0" err="1">
+                <a:latin typeface="Courier New" panose="02070309020205020404" pitchFamily="49" charset="0"/>
+                <a:cs typeface="Courier New" panose="02070309020205020404" pitchFamily="49" charset="0"/>
+              </a:rPr>
+              <a:t>logitsCM</a:t>
+            </a:r>
+            <a:r>
+              <a:rPr lang="en-CA" sz="1400" dirty="0">
+                <a:latin typeface="Courier New" panose="02070309020205020404" pitchFamily="49" charset="0"/>
+                <a:cs typeface="Courier New" panose="02070309020205020404" pitchFamily="49" charset="0"/>
+              </a:rPr>
+              <a:t>,</a:t>
+            </a:r>
+          </a:p>
+          <a:p>
+            <a:r>
+              <a:rPr lang="en-CA" sz="1400" dirty="0">
+                <a:latin typeface="Courier New" panose="02070309020205020404" pitchFamily="49" charset="0"/>
+                <a:cs typeface="Courier New" panose="02070309020205020404" pitchFamily="49" charset="0"/>
+              </a:rPr>
+              <a:t>                  coalminers[, c("age", "Age")])</a:t>
+            </a:r>
+          </a:p>
+          <a:p>
+            <a:r>
+              <a:rPr lang="en-CA" sz="1400" dirty="0" err="1">
+                <a:latin typeface="Courier New" panose="02070309020205020404" pitchFamily="49" charset="0"/>
+                <a:cs typeface="Courier New" panose="02070309020205020404" pitchFamily="49" charset="0"/>
+              </a:rPr>
+              <a:t>logitsCM</a:t>
+            </a:r>
+            <a:endParaRPr lang="en-CA" sz="1400" dirty="0">
+              <a:latin typeface="Courier New" panose="02070309020205020404" pitchFamily="49" charset="0"/>
+              <a:cs typeface="Courier New" panose="02070309020205020404" pitchFamily="49" charset="0"/>
+            </a:endParaRPr>
+          </a:p>
+        </p:txBody>
+      </p:sp>
+      <p:sp>
+        <p:nvSpPr>
+          <p:cNvPr id="5" name="TextBox 4">
+            <a:extLst>
+              <a:ext uri="{FF2B5EF4-FFF2-40B4-BE49-F238E27FC236}">
+                <a16:creationId xmlns:a16="http://schemas.microsoft.com/office/drawing/2014/main" id="{7B5225C8-CEBC-29A5-B961-9954BD763DBC}"/>
               </a:ext>
             </a:extLst>
           </p:cNvPr>
@@ -12127,8 +12336,8 @@
         </p:nvSpPr>
         <p:spPr>
           <a:xfrm>
-            <a:off x="6019800" y="1676400"/>
-            <a:ext cx="2438400" cy="1200329"/>
+            <a:off x="457200" y="1143000"/>
+            <a:ext cx="8229600" cy="381000"/>
           </a:xfrm>
           <a:prstGeom prst="rect">
             <a:avLst/>
@@ -12143,7 +12352,201 @@
           <a:p>
             <a:r>
               <a:rPr lang="en-CA" dirty="0"/>
-              <a:t>Log odds &amp; LORs have similar scales, so it is not terrible to plot them together</a:t>
+              <a:t>Logits and log odds for a bivariate response can be calculated with </a:t>
+            </a:r>
+            <a:r>
+              <a:rPr lang="en-CA" dirty="0" err="1"/>
+              <a:t>vcdExtra</a:t>
+            </a:r>
+            <a:r>
+              <a:rPr lang="en-CA" dirty="0"/>
+              <a:t>::</a:t>
+            </a:r>
+            <a:r>
+              <a:rPr lang="en-CA" dirty="0" err="1"/>
+              <a:t>blogits</a:t>
+            </a:r>
+            <a:r>
+              <a:rPr lang="en-CA" dirty="0"/>
+              <a:t>()</a:t>
+            </a:r>
+          </a:p>
+        </p:txBody>
+      </p:sp>
+      <p:sp>
+        <p:nvSpPr>
+          <p:cNvPr id="6" name="TextBox 5">
+            <a:extLst>
+              <a:ext uri="{FF2B5EF4-FFF2-40B4-BE49-F238E27FC236}">
+                <a16:creationId xmlns:a16="http://schemas.microsoft.com/office/drawing/2014/main" id="{E96240DA-3D70-85C1-6C32-466F7ED30D61}"/>
+              </a:ext>
+            </a:extLst>
+          </p:cNvPr>
+          <p:cNvSpPr txBox="1"/>
+          <p:nvPr/>
+        </p:nvSpPr>
+        <p:spPr>
+          <a:xfrm>
+            <a:off x="533400" y="3733800"/>
+            <a:ext cx="8153400" cy="2554545"/>
+          </a:xfrm>
+          <a:prstGeom prst="rect">
+            <a:avLst/>
+          </a:prstGeom>
+          <a:solidFill>
+            <a:schemeClr val="accent6">
+              <a:lumMod val="20000"/>
+              <a:lumOff val="80000"/>
+              <a:alpha val="60000"/>
+            </a:schemeClr>
+          </a:solidFill>
+        </p:spPr>
+        <p:txBody>
+          <a:bodyPr wrap="square" rtlCol="0">
+            <a:spAutoFit/>
+          </a:bodyPr>
+          <a:lstStyle/>
+          <a:p>
+            <a:r>
+              <a:rPr lang="en-CA" sz="1600" dirty="0">
+                <a:latin typeface="Courier New" panose="02070309020205020404" pitchFamily="49" charset="0"/>
+                <a:cs typeface="Courier New" panose="02070309020205020404" pitchFamily="49" charset="0"/>
+              </a:rPr>
+              <a:t> </a:t>
+            </a:r>
+            <a:r>
+              <a:rPr lang="en-CA" sz="1600" dirty="0" err="1">
+                <a:latin typeface="Courier New" panose="02070309020205020404" pitchFamily="49" charset="0"/>
+                <a:cs typeface="Courier New" panose="02070309020205020404" pitchFamily="49" charset="0"/>
+              </a:rPr>
+              <a:t>logitB</a:t>
+            </a:r>
+            <a:r>
+              <a:rPr lang="en-CA" sz="1600" dirty="0">
+                <a:latin typeface="Courier New" panose="02070309020205020404" pitchFamily="49" charset="0"/>
+                <a:cs typeface="Courier New" panose="02070309020205020404" pitchFamily="49" charset="0"/>
+              </a:rPr>
+              <a:t> </a:t>
+            </a:r>
+            <a:r>
+              <a:rPr lang="en-CA" sz="1600" dirty="0" err="1">
+                <a:latin typeface="Courier New" panose="02070309020205020404" pitchFamily="49" charset="0"/>
+                <a:cs typeface="Courier New" panose="02070309020205020404" pitchFamily="49" charset="0"/>
+              </a:rPr>
+              <a:t>logitW</a:t>
+            </a:r>
+            <a:r>
+              <a:rPr lang="en-CA" sz="1600" dirty="0">
+                <a:latin typeface="Courier New" panose="02070309020205020404" pitchFamily="49" charset="0"/>
+                <a:cs typeface="Courier New" panose="02070309020205020404" pitchFamily="49" charset="0"/>
+              </a:rPr>
+              <a:t> </a:t>
+            </a:r>
+            <a:r>
+              <a:rPr lang="en-CA" sz="1600" dirty="0" err="1">
+                <a:latin typeface="Courier New" panose="02070309020205020404" pitchFamily="49" charset="0"/>
+                <a:cs typeface="Courier New" panose="02070309020205020404" pitchFamily="49" charset="0"/>
+              </a:rPr>
+              <a:t>logOR</a:t>
+            </a:r>
+            <a:r>
+              <a:rPr lang="en-CA" sz="1600" dirty="0">
+                <a:latin typeface="Courier New" panose="02070309020205020404" pitchFamily="49" charset="0"/>
+                <a:cs typeface="Courier New" panose="02070309020205020404" pitchFamily="49" charset="0"/>
+              </a:rPr>
+              <a:t> age </a:t>
+            </a:r>
+            <a:r>
+              <a:rPr lang="en-CA" sz="1600" dirty="0" err="1">
+                <a:latin typeface="Courier New" panose="02070309020205020404" pitchFamily="49" charset="0"/>
+                <a:cs typeface="Courier New" panose="02070309020205020404" pitchFamily="49" charset="0"/>
+              </a:rPr>
+              <a:t>Age</a:t>
+            </a:r>
+            <a:endParaRPr lang="en-CA" sz="1600" dirty="0">
+              <a:latin typeface="Courier New" panose="02070309020205020404" pitchFamily="49" charset="0"/>
+              <a:cs typeface="Courier New" panose="02070309020205020404" pitchFamily="49" charset="0"/>
+            </a:endParaRPr>
+          </a:p>
+          <a:p>
+            <a:r>
+              <a:rPr lang="en-CA" sz="1600" dirty="0">
+                <a:latin typeface="Courier New" panose="02070309020205020404" pitchFamily="49" charset="0"/>
+                <a:cs typeface="Courier New" panose="02070309020205020404" pitchFamily="49" charset="0"/>
+              </a:rPr>
+              <a:t>1 -4.736 -2.868  3.20  22  -4</a:t>
+            </a:r>
+          </a:p>
+          <a:p>
+            <a:r>
+              <a:rPr lang="en-CA" sz="1600" dirty="0">
+                <a:latin typeface="Courier New" panose="02070309020205020404" pitchFamily="49" charset="0"/>
+                <a:cs typeface="Courier New" panose="02070309020205020404" pitchFamily="49" charset="0"/>
+              </a:rPr>
+              <a:t>2 -3.977 -2.557  3.66  27  -3</a:t>
+            </a:r>
+          </a:p>
+          <a:p>
+            <a:r>
+              <a:rPr lang="en-CA" sz="1600" dirty="0">
+                <a:latin typeface="Courier New" panose="02070309020205020404" pitchFamily="49" charset="0"/>
+                <a:cs typeface="Courier New" panose="02070309020205020404" pitchFamily="49" charset="0"/>
+              </a:rPr>
+              <a:t>3 -3.317 -2.094  3.38  32  -2</a:t>
+            </a:r>
+          </a:p>
+          <a:p>
+            <a:r>
+              <a:rPr lang="en-CA" sz="1600" dirty="0">
+                <a:latin typeface="Courier New" panose="02070309020205020404" pitchFamily="49" charset="0"/>
+                <a:cs typeface="Courier New" panose="02070309020205020404" pitchFamily="49" charset="0"/>
+              </a:rPr>
+              <a:t>4 -2.733 -1.848  3.13  37  -1</a:t>
+            </a:r>
+          </a:p>
+          <a:p>
+            <a:r>
+              <a:rPr lang="en-CA" sz="1600" dirty="0">
+                <a:latin typeface="Courier New" panose="02070309020205020404" pitchFamily="49" charset="0"/>
+                <a:cs typeface="Courier New" panose="02070309020205020404" pitchFamily="49" charset="0"/>
+              </a:rPr>
+              <a:t>5 -2.215 -1.420  3.01  42   0</a:t>
+            </a:r>
+          </a:p>
+          <a:p>
+            <a:r>
+              <a:rPr lang="en-CA" sz="1600" dirty="0">
+                <a:latin typeface="Courier New" panose="02070309020205020404" pitchFamily="49" charset="0"/>
+                <a:cs typeface="Courier New" panose="02070309020205020404" pitchFamily="49" charset="0"/>
+              </a:rPr>
+              <a:t>6 -1.739 -1.109  2.78  47   1</a:t>
+            </a:r>
+          </a:p>
+          <a:p>
+            <a:r>
+              <a:rPr lang="en-CA" sz="1600" dirty="0">
+                <a:latin typeface="Courier New" panose="02070309020205020404" pitchFamily="49" charset="0"/>
+                <a:cs typeface="Courier New" panose="02070309020205020404" pitchFamily="49" charset="0"/>
+              </a:rPr>
+              <a:t>7 -1.101 -0.797  2.92  52   2</a:t>
+            </a:r>
+          </a:p>
+          <a:p>
+            <a:r>
+              <a:rPr lang="en-CA" sz="1600" dirty="0">
+                <a:latin typeface="Courier New" panose="02070309020205020404" pitchFamily="49" charset="0"/>
+                <a:cs typeface="Courier New" panose="02070309020205020404" pitchFamily="49" charset="0"/>
+              </a:rPr>
+              <a:t>8 -0.758 -0.572  2.44  57   3</a:t>
+            </a:r>
+          </a:p>
+          <a:p>
+            <a:r>
+              <a:rPr lang="en-CA" sz="1600" dirty="0">
+                <a:latin typeface="Courier New" panose="02070309020205020404" pitchFamily="49" charset="0"/>
+                <a:cs typeface="Courier New" panose="02070309020205020404" pitchFamily="49" charset="0"/>
+              </a:rPr>
+              <a:t>9 -0.319 -0.226  2.63  62   4</a:t>
             </a:r>
           </a:p>
         </p:txBody>
@@ -12151,7 +12554,7 @@
     </p:spTree>
     <p:extLst>
       <p:ext uri="{BB962C8B-B14F-4D97-AF65-F5344CB8AC3E}">
-        <p14:creationId xmlns:p14="http://schemas.microsoft.com/office/powerpoint/2010/main" val="1292110824"/>
+        <p14:creationId xmlns:p14="http://schemas.microsoft.com/office/powerpoint/2010/main" val="3842136123"/>
       </p:ext>
     </p:extLst>
   </p:cSld>
@@ -12232,6 +12635,160 @@
             <a:fld id="{621225AB-15B9-4C79-A121-04D1DC7E2307}" type="slidenum">
               <a:rPr lang="en-US" smtClean="0"/>
               <a:t>41</a:t>
+            </a:fld>
+            <a:endParaRPr lang="en-US"/>
+          </a:p>
+        </p:txBody>
+      </p:sp>
+      <p:pic>
+        <p:nvPicPr>
+          <p:cNvPr id="5" name="Picture 4">
+            <a:extLst>
+              <a:ext uri="{FF2B5EF4-FFF2-40B4-BE49-F238E27FC236}">
+                <a16:creationId xmlns:a16="http://schemas.microsoft.com/office/drawing/2014/main" id="{BB72F882-678B-F214-250C-5CFEABBEC268}"/>
+              </a:ext>
+            </a:extLst>
+          </p:cNvPr>
+          <p:cNvPicPr>
+            <a:picLocks noChangeAspect="1"/>
+          </p:cNvPicPr>
+          <p:nvPr/>
+        </p:nvPicPr>
+        <p:blipFill>
+          <a:blip r:embed="rId2"/>
+          <a:stretch>
+            <a:fillRect/>
+          </a:stretch>
+        </p:blipFill>
+        <p:spPr>
+          <a:xfrm>
+            <a:off x="486286" y="1562695"/>
+            <a:ext cx="8171428" cy="4761905"/>
+          </a:xfrm>
+          <a:prstGeom prst="rect">
+            <a:avLst/>
+          </a:prstGeom>
+        </p:spPr>
+      </p:pic>
+      <p:sp>
+        <p:nvSpPr>
+          <p:cNvPr id="6" name="TextBox 5">
+            <a:extLst>
+              <a:ext uri="{FF2B5EF4-FFF2-40B4-BE49-F238E27FC236}">
+                <a16:creationId xmlns:a16="http://schemas.microsoft.com/office/drawing/2014/main" id="{A4530166-87A4-1D76-5DD6-9E048BECFD15}"/>
+              </a:ext>
+            </a:extLst>
+          </p:cNvPr>
+          <p:cNvSpPr txBox="1"/>
+          <p:nvPr/>
+        </p:nvSpPr>
+        <p:spPr>
+          <a:xfrm>
+            <a:off x="6019800" y="1676400"/>
+            <a:ext cx="2438400" cy="1200329"/>
+          </a:xfrm>
+          <a:prstGeom prst="rect">
+            <a:avLst/>
+          </a:prstGeom>
+          <a:noFill/>
+        </p:spPr>
+        <p:txBody>
+          <a:bodyPr wrap="square" rtlCol="0">
+            <a:spAutoFit/>
+          </a:bodyPr>
+          <a:lstStyle/>
+          <a:p>
+            <a:r>
+              <a:rPr lang="en-CA" dirty="0"/>
+              <a:t>Log odds &amp; LORs have similar scales, so it is not terrible to plot them together</a:t>
+            </a:r>
+          </a:p>
+        </p:txBody>
+      </p:sp>
+    </p:spTree>
+    <p:extLst>
+      <p:ext uri="{BB962C8B-B14F-4D97-AF65-F5344CB8AC3E}">
+        <p14:creationId xmlns:p14="http://schemas.microsoft.com/office/powerpoint/2010/main" val="1292110824"/>
+      </p:ext>
+    </p:extLst>
+  </p:cSld>
+  <p:clrMapOvr>
+    <a:masterClrMapping/>
+  </p:clrMapOvr>
+</p:sld>
+</file>
+
+<file path=ppt/slides/slide42.xml><?xml version="1.0" encoding="utf-8"?>
+<p:sld xmlns:a="http://schemas.openxmlformats.org/drawingml/2006/main" xmlns:r="http://schemas.openxmlformats.org/officeDocument/2006/relationships" xmlns:p="http://schemas.openxmlformats.org/presentationml/2006/main">
+  <p:cSld>
+    <p:spTree>
+      <p:nvGrpSpPr>
+        <p:cNvPr id="1" name=""/>
+        <p:cNvGrpSpPr/>
+        <p:nvPr/>
+      </p:nvGrpSpPr>
+      <p:grpSpPr>
+        <a:xfrm>
+          <a:off x="0" y="0"/>
+          <a:ext cx="0" cy="0"/>
+          <a:chOff x="0" y="0"/>
+          <a:chExt cx="0" cy="0"/>
+        </a:xfrm>
+      </p:grpSpPr>
+      <p:sp>
+        <p:nvSpPr>
+          <p:cNvPr id="2" name="Title 1">
+            <a:extLst>
+              <a:ext uri="{FF2B5EF4-FFF2-40B4-BE49-F238E27FC236}">
+                <a16:creationId xmlns:a16="http://schemas.microsoft.com/office/drawing/2014/main" id="{09D72CF6-1A4E-1ACE-0A8F-90CD70F06062}"/>
+              </a:ext>
+            </a:extLst>
+          </p:cNvPr>
+          <p:cNvSpPr>
+            <a:spLocks noGrp="1"/>
+          </p:cNvSpPr>
+          <p:nvPr>
+            <p:ph type="title"/>
+          </p:nvPr>
+        </p:nvSpPr>
+        <p:spPr/>
+        <p:txBody>
+          <a:bodyPr>
+            <a:normAutofit/>
+          </a:bodyPr>
+          <a:lstStyle/>
+          <a:p>
+            <a:r>
+              <a:rPr lang="en-CA" sz="3200" dirty="0"/>
+              <a:t>Linear model for log odds and log odds ratios</a:t>
+            </a:r>
+          </a:p>
+        </p:txBody>
+      </p:sp>
+      <p:sp>
+        <p:nvSpPr>
+          <p:cNvPr id="3" name="Slide Number Placeholder 2">
+            <a:extLst>
+              <a:ext uri="{FF2B5EF4-FFF2-40B4-BE49-F238E27FC236}">
+                <a16:creationId xmlns:a16="http://schemas.microsoft.com/office/drawing/2014/main" id="{03342D3D-5E22-FBB3-FC53-2E485B19119D}"/>
+              </a:ext>
+            </a:extLst>
+          </p:cNvPr>
+          <p:cNvSpPr>
+            <a:spLocks noGrp="1"/>
+          </p:cNvSpPr>
+          <p:nvPr>
+            <p:ph type="sldNum" sz="quarter" idx="12"/>
+          </p:nvPr>
+        </p:nvSpPr>
+        <p:spPr/>
+        <p:txBody>
+          <a:bodyPr/>
+          <a:lstStyle/>
+          <a:p>
+            <a:fld id="{621225AB-15B9-4C79-A121-04D1DC7E2307}" type="slidenum">
+              <a:rPr lang="en-US" smtClean="0"/>
+              <a:t>42</a:t>
             </a:fld>
             <a:endParaRPr lang="en-US"/>
           </a:p>
@@ -12280,7 +12837,7 @@
 </p:sld>
 </file>
 
-<file path=ppt/slides/slide42.xml><?xml version="1.0" encoding="utf-8"?>
+<file path=ppt/slides/slide43.xml><?xml version="1.0" encoding="utf-8"?>
 <p:sld xmlns:a="http://schemas.openxmlformats.org/drawingml/2006/main" xmlns:r="http://schemas.openxmlformats.org/officeDocument/2006/relationships" xmlns:p="http://schemas.openxmlformats.org/presentationml/2006/main">
   <p:cSld>
     <p:spTree>
@@ -12350,7 +12907,7 @@
           <a:p>
             <a:fld id="{621225AB-15B9-4C79-A121-04D1DC7E2307}" type="slidenum">
               <a:rPr lang="en-US" smtClean="0"/>
-              <a:t>42</a:t>
+              <a:t>43</a:t>
             </a:fld>
             <a:endParaRPr lang="en-US"/>
           </a:p>
@@ -12399,7 +12956,7 @@
 </p:sld>
 </file>
 
-<file path=ppt/slides/slide43.xml><?xml version="1.0" encoding="utf-8"?>
+<file path=ppt/slides/slide44.xml><?xml version="1.0" encoding="utf-8"?>
 <p:sld xmlns:a="http://schemas.openxmlformats.org/drawingml/2006/main" xmlns:r="http://schemas.openxmlformats.org/officeDocument/2006/relationships" xmlns:p="http://schemas.openxmlformats.org/presentationml/2006/main">
   <p:cSld>
     <p:spTree>
@@ -12421,6 +12978,2116 @@
           <p:cNvPr id="2" name="Title 1">
             <a:extLst>
               <a:ext uri="{FF2B5EF4-FFF2-40B4-BE49-F238E27FC236}">
+                <a16:creationId xmlns:a16="http://schemas.microsoft.com/office/drawing/2014/main" id="{E510C36E-8960-E9F8-DE10-C4D1C31CC205}"/>
+              </a:ext>
+            </a:extLst>
+          </p:cNvPr>
+          <p:cNvSpPr>
+            <a:spLocks noGrp="1"/>
+          </p:cNvSpPr>
+          <p:nvPr>
+            <p:ph type="title"/>
+          </p:nvPr>
+        </p:nvSpPr>
+        <p:spPr/>
+        <p:txBody>
+          <a:bodyPr>
+            <a:normAutofit fontScale="90000"/>
+          </a:bodyPr>
+          <a:lstStyle/>
+          <a:p>
+            <a:r>
+              <a:rPr lang="en-CA" dirty="0"/>
+              <a:t>Plotting …</a:t>
+            </a:r>
+          </a:p>
+        </p:txBody>
+      </p:sp>
+      <p:sp>
+        <p:nvSpPr>
+          <p:cNvPr id="3" name="Slide Number Placeholder 2">
+            <a:extLst>
+              <a:ext uri="{FF2B5EF4-FFF2-40B4-BE49-F238E27FC236}">
+                <a16:creationId xmlns:a16="http://schemas.microsoft.com/office/drawing/2014/main" id="{3D543528-9396-6D50-2AF8-CEC7EECD6925}"/>
+              </a:ext>
+            </a:extLst>
+          </p:cNvPr>
+          <p:cNvSpPr>
+            <a:spLocks noGrp="1"/>
+          </p:cNvSpPr>
+          <p:nvPr>
+            <p:ph type="sldNum" sz="quarter" idx="12"/>
+          </p:nvPr>
+        </p:nvSpPr>
+        <p:spPr/>
+        <p:txBody>
+          <a:bodyPr/>
+          <a:lstStyle/>
+          <a:p>
+            <a:fld id="{621225AB-15B9-4C79-A121-04D1DC7E2307}" type="slidenum">
+              <a:rPr lang="en-US" smtClean="0"/>
+              <a:t>44</a:t>
+            </a:fld>
+            <a:endParaRPr lang="en-US"/>
+          </a:p>
+        </p:txBody>
+      </p:sp>
+      <p:sp>
+        <p:nvSpPr>
+          <p:cNvPr id="4" name="TextBox 3">
+            <a:extLst>
+              <a:ext uri="{FF2B5EF4-FFF2-40B4-BE49-F238E27FC236}">
+                <a16:creationId xmlns:a16="http://schemas.microsoft.com/office/drawing/2014/main" id="{14AAF648-EB82-FDB1-E45D-7FCF605C2E63}"/>
+              </a:ext>
+            </a:extLst>
+          </p:cNvPr>
+          <p:cNvSpPr txBox="1"/>
+          <p:nvPr/>
+        </p:nvSpPr>
+        <p:spPr>
+          <a:xfrm>
+            <a:off x="533400" y="1586805"/>
+            <a:ext cx="8153400" cy="1384995"/>
+          </a:xfrm>
+          <a:prstGeom prst="rect">
+            <a:avLst/>
+          </a:prstGeom>
+          <a:solidFill>
+            <a:schemeClr val="accent6">
+              <a:lumMod val="20000"/>
+              <a:lumOff val="80000"/>
+              <a:alpha val="60000"/>
+            </a:schemeClr>
+          </a:solidFill>
+        </p:spPr>
+        <p:txBody>
+          <a:bodyPr wrap="square" rtlCol="0">
+            <a:spAutoFit/>
+          </a:bodyPr>
+          <a:lstStyle/>
+          <a:p>
+            <a:r>
+              <a:rPr lang="en-CA" sz="1400" dirty="0" err="1">
+                <a:latin typeface="Courier New" panose="02070309020205020404" pitchFamily="49" charset="0"/>
+                <a:cs typeface="Courier New" panose="02070309020205020404" pitchFamily="49" charset="0"/>
+              </a:rPr>
+              <a:t>matplot</a:t>
+            </a:r>
+            <a:r>
+              <a:rPr lang="en-CA" sz="1400" dirty="0">
+                <a:latin typeface="Courier New" panose="02070309020205020404" pitchFamily="49" charset="0"/>
+                <a:cs typeface="Courier New" panose="02070309020205020404" pitchFamily="49" charset="0"/>
+              </a:rPr>
+              <a:t>(age, </a:t>
+            </a:r>
+            <a:r>
+              <a:rPr lang="en-CA" sz="1400" dirty="0" err="1">
+                <a:latin typeface="Courier New" panose="02070309020205020404" pitchFamily="49" charset="0"/>
+                <a:cs typeface="Courier New" panose="02070309020205020404" pitchFamily="49" charset="0"/>
+              </a:rPr>
+              <a:t>logitsCM</a:t>
+            </a:r>
+            <a:r>
+              <a:rPr lang="en-CA" sz="1400" dirty="0">
+                <a:latin typeface="Courier New" panose="02070309020205020404" pitchFamily="49" charset="0"/>
+                <a:cs typeface="Courier New" panose="02070309020205020404" pitchFamily="49" charset="0"/>
+              </a:rPr>
+              <a:t>[, 1:3], type = "p",</a:t>
+            </a:r>
+          </a:p>
+          <a:p>
+            <a:r>
+              <a:rPr lang="en-CA" sz="1400" dirty="0">
+                <a:latin typeface="Courier New" panose="02070309020205020404" pitchFamily="49" charset="0"/>
+                <a:cs typeface="Courier New" panose="02070309020205020404" pitchFamily="49" charset="0"/>
+              </a:rPr>
+              <a:t>        col = col, </a:t>
+            </a:r>
+            <a:r>
+              <a:rPr lang="en-CA" sz="1400" dirty="0" err="1">
+                <a:latin typeface="Courier New" panose="02070309020205020404" pitchFamily="49" charset="0"/>
+                <a:cs typeface="Courier New" panose="02070309020205020404" pitchFamily="49" charset="0"/>
+              </a:rPr>
+              <a:t>pch</a:t>
+            </a:r>
+            <a:r>
+              <a:rPr lang="en-CA" sz="1400" dirty="0">
+                <a:latin typeface="Courier New" panose="02070309020205020404" pitchFamily="49" charset="0"/>
+                <a:cs typeface="Courier New" panose="02070309020205020404" pitchFamily="49" charset="0"/>
+              </a:rPr>
+              <a:t> = </a:t>
+            </a:r>
+            <a:r>
+              <a:rPr lang="en-CA" sz="1400" dirty="0" err="1">
+                <a:latin typeface="Courier New" panose="02070309020205020404" pitchFamily="49" charset="0"/>
+                <a:cs typeface="Courier New" panose="02070309020205020404" pitchFamily="49" charset="0"/>
+              </a:rPr>
+              <a:t>pch</a:t>
+            </a:r>
+            <a:r>
+              <a:rPr lang="en-CA" sz="1400" dirty="0">
+                <a:latin typeface="Courier New" panose="02070309020205020404" pitchFamily="49" charset="0"/>
+                <a:cs typeface="Courier New" panose="02070309020205020404" pitchFamily="49" charset="0"/>
+              </a:rPr>
+              <a:t>, </a:t>
+            </a:r>
+            <a:r>
+              <a:rPr lang="en-CA" sz="1400" dirty="0" err="1">
+                <a:latin typeface="Courier New" panose="02070309020205020404" pitchFamily="49" charset="0"/>
+                <a:cs typeface="Courier New" panose="02070309020205020404" pitchFamily="49" charset="0"/>
+              </a:rPr>
+              <a:t>cex</a:t>
+            </a:r>
+            <a:r>
+              <a:rPr lang="en-CA" sz="1400" dirty="0">
+                <a:latin typeface="Courier New" panose="02070309020205020404" pitchFamily="49" charset="0"/>
+                <a:cs typeface="Courier New" panose="02070309020205020404" pitchFamily="49" charset="0"/>
+              </a:rPr>
+              <a:t> = 1.2, </a:t>
+            </a:r>
+            <a:r>
+              <a:rPr lang="en-CA" sz="1400" dirty="0" err="1">
+                <a:latin typeface="Courier New" panose="02070309020205020404" pitchFamily="49" charset="0"/>
+                <a:cs typeface="Courier New" panose="02070309020205020404" pitchFamily="49" charset="0"/>
+              </a:rPr>
+              <a:t>cex.lab</a:t>
+            </a:r>
+            <a:r>
+              <a:rPr lang="en-CA" sz="1400" dirty="0">
+                <a:latin typeface="Courier New" panose="02070309020205020404" pitchFamily="49" charset="0"/>
+                <a:cs typeface="Courier New" panose="02070309020205020404" pitchFamily="49" charset="0"/>
+              </a:rPr>
+              <a:t> = 1.25,</a:t>
+            </a:r>
+          </a:p>
+          <a:p>
+            <a:r>
+              <a:rPr lang="en-CA" sz="1400" dirty="0">
+                <a:latin typeface="Courier New" panose="02070309020205020404" pitchFamily="49" charset="0"/>
+                <a:cs typeface="Courier New" panose="02070309020205020404" pitchFamily="49" charset="0"/>
+              </a:rPr>
+              <a:t>        </a:t>
+            </a:r>
+            <a:r>
+              <a:rPr lang="en-CA" sz="1400" dirty="0" err="1">
+                <a:latin typeface="Courier New" panose="02070309020205020404" pitchFamily="49" charset="0"/>
+                <a:cs typeface="Courier New" panose="02070309020205020404" pitchFamily="49" charset="0"/>
+              </a:rPr>
+              <a:t>xlab</a:t>
+            </a:r>
+            <a:r>
+              <a:rPr lang="en-CA" sz="1400" dirty="0">
+                <a:latin typeface="Courier New" panose="02070309020205020404" pitchFamily="49" charset="0"/>
+                <a:cs typeface="Courier New" panose="02070309020205020404" pitchFamily="49" charset="0"/>
+              </a:rPr>
+              <a:t> = "Age", </a:t>
+            </a:r>
+            <a:r>
+              <a:rPr lang="en-CA" sz="1400" dirty="0" err="1">
+                <a:latin typeface="Courier New" panose="02070309020205020404" pitchFamily="49" charset="0"/>
+                <a:cs typeface="Courier New" panose="02070309020205020404" pitchFamily="49" charset="0"/>
+              </a:rPr>
+              <a:t>ylab</a:t>
+            </a:r>
+            <a:r>
+              <a:rPr lang="en-CA" sz="1400" dirty="0">
+                <a:latin typeface="Courier New" panose="02070309020205020404" pitchFamily="49" charset="0"/>
+                <a:cs typeface="Courier New" panose="02070309020205020404" pitchFamily="49" charset="0"/>
+              </a:rPr>
+              <a:t> = "Log Odds or Odds Ratio")</a:t>
+            </a:r>
+          </a:p>
+          <a:p>
+            <a:r>
+              <a:rPr lang="en-CA" sz="1400" dirty="0" err="1">
+                <a:latin typeface="Courier New" panose="02070309020205020404" pitchFamily="49" charset="0"/>
+                <a:cs typeface="Courier New" panose="02070309020205020404" pitchFamily="49" charset="0"/>
+              </a:rPr>
+              <a:t>abline</a:t>
+            </a:r>
+            <a:r>
+              <a:rPr lang="en-CA" sz="1400" dirty="0">
+                <a:latin typeface="Courier New" panose="02070309020205020404" pitchFamily="49" charset="0"/>
+                <a:cs typeface="Courier New" panose="02070309020205020404" pitchFamily="49" charset="0"/>
+              </a:rPr>
+              <a:t>(</a:t>
+            </a:r>
+            <a:r>
+              <a:rPr lang="en-CA" sz="1400" dirty="0" err="1">
+                <a:latin typeface="Courier New" panose="02070309020205020404" pitchFamily="49" charset="0"/>
+                <a:cs typeface="Courier New" panose="02070309020205020404" pitchFamily="49" charset="0"/>
+              </a:rPr>
+              <a:t>lm</a:t>
+            </a:r>
+            <a:r>
+              <a:rPr lang="en-CA" sz="1400" dirty="0">
+                <a:latin typeface="Courier New" panose="02070309020205020404" pitchFamily="49" charset="0"/>
+                <a:cs typeface="Courier New" panose="02070309020205020404" pitchFamily="49" charset="0"/>
+              </a:rPr>
+              <a:t>(</a:t>
+            </a:r>
+            <a:r>
+              <a:rPr lang="en-CA" sz="1400" dirty="0" err="1">
+                <a:latin typeface="Courier New" panose="02070309020205020404" pitchFamily="49" charset="0"/>
+                <a:cs typeface="Courier New" panose="02070309020205020404" pitchFamily="49" charset="0"/>
+              </a:rPr>
+              <a:t>logitsCM</a:t>
+            </a:r>
+            <a:r>
+              <a:rPr lang="en-CA" sz="1400" dirty="0">
+                <a:latin typeface="Courier New" panose="02070309020205020404" pitchFamily="49" charset="0"/>
+                <a:cs typeface="Courier New" panose="02070309020205020404" pitchFamily="49" charset="0"/>
+              </a:rPr>
+              <a:t>[,1] ~ age), col = col[1], </a:t>
+            </a:r>
+            <a:r>
+              <a:rPr lang="en-CA" sz="1400" dirty="0" err="1">
+                <a:latin typeface="Courier New" panose="02070309020205020404" pitchFamily="49" charset="0"/>
+                <a:cs typeface="Courier New" panose="02070309020205020404" pitchFamily="49" charset="0"/>
+              </a:rPr>
+              <a:t>lwd</a:t>
+            </a:r>
+            <a:r>
+              <a:rPr lang="en-CA" sz="1400" dirty="0">
+                <a:latin typeface="Courier New" panose="02070309020205020404" pitchFamily="49" charset="0"/>
+                <a:cs typeface="Courier New" panose="02070309020205020404" pitchFamily="49" charset="0"/>
+              </a:rPr>
+              <a:t> = 2)</a:t>
+            </a:r>
+          </a:p>
+          <a:p>
+            <a:r>
+              <a:rPr lang="en-CA" sz="1400" dirty="0" err="1">
+                <a:latin typeface="Courier New" panose="02070309020205020404" pitchFamily="49" charset="0"/>
+                <a:cs typeface="Courier New" panose="02070309020205020404" pitchFamily="49" charset="0"/>
+              </a:rPr>
+              <a:t>abline</a:t>
+            </a:r>
+            <a:r>
+              <a:rPr lang="en-CA" sz="1400" dirty="0">
+                <a:latin typeface="Courier New" panose="02070309020205020404" pitchFamily="49" charset="0"/>
+                <a:cs typeface="Courier New" panose="02070309020205020404" pitchFamily="49" charset="0"/>
+              </a:rPr>
+              <a:t>(</a:t>
+            </a:r>
+            <a:r>
+              <a:rPr lang="en-CA" sz="1400" dirty="0" err="1">
+                <a:latin typeface="Courier New" panose="02070309020205020404" pitchFamily="49" charset="0"/>
+                <a:cs typeface="Courier New" panose="02070309020205020404" pitchFamily="49" charset="0"/>
+              </a:rPr>
+              <a:t>lm</a:t>
+            </a:r>
+            <a:r>
+              <a:rPr lang="en-CA" sz="1400" dirty="0">
+                <a:latin typeface="Courier New" panose="02070309020205020404" pitchFamily="49" charset="0"/>
+                <a:cs typeface="Courier New" panose="02070309020205020404" pitchFamily="49" charset="0"/>
+              </a:rPr>
+              <a:t>(</a:t>
+            </a:r>
+            <a:r>
+              <a:rPr lang="en-CA" sz="1400" dirty="0" err="1">
+                <a:latin typeface="Courier New" panose="02070309020205020404" pitchFamily="49" charset="0"/>
+                <a:cs typeface="Courier New" panose="02070309020205020404" pitchFamily="49" charset="0"/>
+              </a:rPr>
+              <a:t>logitsCM</a:t>
+            </a:r>
+            <a:r>
+              <a:rPr lang="en-CA" sz="1400" dirty="0">
+                <a:latin typeface="Courier New" panose="02070309020205020404" pitchFamily="49" charset="0"/>
+                <a:cs typeface="Courier New" panose="02070309020205020404" pitchFamily="49" charset="0"/>
+              </a:rPr>
+              <a:t>[,2] ~ age), col = col[2], </a:t>
+            </a:r>
+            <a:r>
+              <a:rPr lang="en-CA" sz="1400" dirty="0" err="1">
+                <a:latin typeface="Courier New" panose="02070309020205020404" pitchFamily="49" charset="0"/>
+                <a:cs typeface="Courier New" panose="02070309020205020404" pitchFamily="49" charset="0"/>
+              </a:rPr>
+              <a:t>lwd</a:t>
+            </a:r>
+            <a:r>
+              <a:rPr lang="en-CA" sz="1400" dirty="0">
+                <a:latin typeface="Courier New" panose="02070309020205020404" pitchFamily="49" charset="0"/>
+                <a:cs typeface="Courier New" panose="02070309020205020404" pitchFamily="49" charset="0"/>
+              </a:rPr>
+              <a:t> = 2)</a:t>
+            </a:r>
+          </a:p>
+          <a:p>
+            <a:r>
+              <a:rPr lang="en-CA" sz="1400" dirty="0" err="1">
+                <a:latin typeface="Courier New" panose="02070309020205020404" pitchFamily="49" charset="0"/>
+                <a:cs typeface="Courier New" panose="02070309020205020404" pitchFamily="49" charset="0"/>
+              </a:rPr>
+              <a:t>abline</a:t>
+            </a:r>
+            <a:r>
+              <a:rPr lang="en-CA" sz="1400" dirty="0">
+                <a:latin typeface="Courier New" panose="02070309020205020404" pitchFamily="49" charset="0"/>
+                <a:cs typeface="Courier New" panose="02070309020205020404" pitchFamily="49" charset="0"/>
+              </a:rPr>
+              <a:t>(</a:t>
+            </a:r>
+            <a:r>
+              <a:rPr lang="en-CA" sz="1400" dirty="0" err="1">
+                <a:latin typeface="Courier New" panose="02070309020205020404" pitchFamily="49" charset="0"/>
+                <a:cs typeface="Courier New" panose="02070309020205020404" pitchFamily="49" charset="0"/>
+              </a:rPr>
+              <a:t>lm</a:t>
+            </a:r>
+            <a:r>
+              <a:rPr lang="en-CA" sz="1400" dirty="0">
+                <a:latin typeface="Courier New" panose="02070309020205020404" pitchFamily="49" charset="0"/>
+                <a:cs typeface="Courier New" panose="02070309020205020404" pitchFamily="49" charset="0"/>
+              </a:rPr>
+              <a:t>(</a:t>
+            </a:r>
+            <a:r>
+              <a:rPr lang="en-CA" sz="1400" dirty="0" err="1">
+                <a:latin typeface="Courier New" panose="02070309020205020404" pitchFamily="49" charset="0"/>
+                <a:cs typeface="Courier New" panose="02070309020205020404" pitchFamily="49" charset="0"/>
+              </a:rPr>
+              <a:t>logitsCM</a:t>
+            </a:r>
+            <a:r>
+              <a:rPr lang="en-CA" sz="1400" dirty="0">
+                <a:latin typeface="Courier New" panose="02070309020205020404" pitchFamily="49" charset="0"/>
+                <a:cs typeface="Courier New" panose="02070309020205020404" pitchFamily="49" charset="0"/>
+              </a:rPr>
+              <a:t>[,3] ~ age), col = col[3], </a:t>
+            </a:r>
+            <a:r>
+              <a:rPr lang="en-CA" sz="1400" dirty="0" err="1">
+                <a:latin typeface="Courier New" panose="02070309020205020404" pitchFamily="49" charset="0"/>
+                <a:cs typeface="Courier New" panose="02070309020205020404" pitchFamily="49" charset="0"/>
+              </a:rPr>
+              <a:t>lwd</a:t>
+            </a:r>
+            <a:r>
+              <a:rPr lang="en-CA" sz="1400" dirty="0">
+                <a:latin typeface="Courier New" panose="02070309020205020404" pitchFamily="49" charset="0"/>
+                <a:cs typeface="Courier New" panose="02070309020205020404" pitchFamily="49" charset="0"/>
+              </a:rPr>
+              <a:t> = 2)</a:t>
+            </a:r>
+          </a:p>
+        </p:txBody>
+      </p:sp>
+      <p:sp>
+        <p:nvSpPr>
+          <p:cNvPr id="5" name="TextBox 4">
+            <a:extLst>
+              <a:ext uri="{FF2B5EF4-FFF2-40B4-BE49-F238E27FC236}">
+                <a16:creationId xmlns:a16="http://schemas.microsoft.com/office/drawing/2014/main" id="{B2DF71AC-4426-7E5F-2F8C-931BD2660B34}"/>
+              </a:ext>
+            </a:extLst>
+          </p:cNvPr>
+          <p:cNvSpPr txBox="1"/>
+          <p:nvPr/>
+        </p:nvSpPr>
+        <p:spPr>
+          <a:xfrm>
+            <a:off x="457200" y="1066800"/>
+            <a:ext cx="8229600" cy="381000"/>
+          </a:xfrm>
+          <a:prstGeom prst="rect">
+            <a:avLst/>
+          </a:prstGeom>
+          <a:noFill/>
+        </p:spPr>
+        <p:txBody>
+          <a:bodyPr wrap="square" rtlCol="0">
+            <a:spAutoFit/>
+          </a:bodyPr>
+          <a:lstStyle/>
+          <a:p>
+            <a:r>
+              <a:rPr lang="en-CA" dirty="0"/>
+              <a:t>With the data in this form, we can use </a:t>
+            </a:r>
+            <a:r>
+              <a:rPr lang="en-CA" dirty="0" err="1"/>
+              <a:t>matplot</a:t>
+            </a:r>
+            <a:r>
+              <a:rPr lang="en-CA" dirty="0"/>
+              <a:t>() to plot each column against age</a:t>
+            </a:r>
+          </a:p>
+        </p:txBody>
+      </p:sp>
+      <p:pic>
+        <p:nvPicPr>
+          <p:cNvPr id="7" name="Picture 6">
+            <a:extLst>
+              <a:ext uri="{FF2B5EF4-FFF2-40B4-BE49-F238E27FC236}">
+                <a16:creationId xmlns:a16="http://schemas.microsoft.com/office/drawing/2014/main" id="{BE8CCAB3-8E36-E06E-CDCC-116F431CE72D}"/>
+              </a:ext>
+            </a:extLst>
+          </p:cNvPr>
+          <p:cNvPicPr>
+            <a:picLocks noChangeAspect="1"/>
+          </p:cNvPicPr>
+          <p:nvPr/>
+        </p:nvPicPr>
+        <p:blipFill>
+          <a:blip r:embed="rId2"/>
+          <a:stretch>
+            <a:fillRect/>
+          </a:stretch>
+        </p:blipFill>
+        <p:spPr>
+          <a:xfrm>
+            <a:off x="4610343" y="3415103"/>
+            <a:ext cx="3885714" cy="3123809"/>
+          </a:xfrm>
+          <a:prstGeom prst="rect">
+            <a:avLst/>
+          </a:prstGeom>
+        </p:spPr>
+      </p:pic>
+      <p:sp>
+        <p:nvSpPr>
+          <p:cNvPr id="8" name="TextBox 7">
+            <a:extLst>
+              <a:ext uri="{FF2B5EF4-FFF2-40B4-BE49-F238E27FC236}">
+                <a16:creationId xmlns:a16="http://schemas.microsoft.com/office/drawing/2014/main" id="{9C91D8CC-AD49-8A26-E161-207FA9B2AF84}"/>
+              </a:ext>
+            </a:extLst>
+          </p:cNvPr>
+          <p:cNvSpPr txBox="1"/>
+          <p:nvPr/>
+        </p:nvSpPr>
+        <p:spPr>
+          <a:xfrm>
+            <a:off x="533400" y="3581400"/>
+            <a:ext cx="3885714" cy="892552"/>
+          </a:xfrm>
+          <a:prstGeom prst="rect">
+            <a:avLst/>
+          </a:prstGeom>
+          <a:noFill/>
+        </p:spPr>
+        <p:txBody>
+          <a:bodyPr wrap="square" rtlCol="0">
+            <a:spAutoFit/>
+          </a:bodyPr>
+          <a:lstStyle/>
+          <a:p>
+            <a:r>
+              <a:rPr lang="en-CA" dirty="0"/>
+              <a:t>To plot the quadratic fit, simply use</a:t>
+            </a:r>
+          </a:p>
+          <a:p>
+            <a:endParaRPr lang="en-CA" dirty="0"/>
+          </a:p>
+          <a:p>
+            <a:r>
+              <a:rPr lang="en-CA" sz="1600" dirty="0" err="1">
+                <a:latin typeface="Courier New" panose="02070309020205020404" pitchFamily="49" charset="0"/>
+                <a:cs typeface="Courier New" panose="02070309020205020404" pitchFamily="49" charset="0"/>
+              </a:rPr>
+              <a:t>lm</a:t>
+            </a:r>
+            <a:r>
+              <a:rPr lang="en-CA" sz="1600" dirty="0">
+                <a:latin typeface="Courier New" panose="02070309020205020404" pitchFamily="49" charset="0"/>
+                <a:cs typeface="Courier New" panose="02070309020205020404" pitchFamily="49" charset="0"/>
+              </a:rPr>
+              <a:t>(</a:t>
+            </a:r>
+            <a:r>
+              <a:rPr lang="en-CA" sz="1600" dirty="0" err="1">
+                <a:latin typeface="Courier New" panose="02070309020205020404" pitchFamily="49" charset="0"/>
+                <a:cs typeface="Courier New" panose="02070309020205020404" pitchFamily="49" charset="0"/>
+              </a:rPr>
+              <a:t>logitsCM</a:t>
+            </a:r>
+            <a:r>
+              <a:rPr lang="en-CA" sz="1600" dirty="0">
+                <a:latin typeface="Courier New" panose="02070309020205020404" pitchFamily="49" charset="0"/>
+                <a:cs typeface="Courier New" panose="02070309020205020404" pitchFamily="49" charset="0"/>
+              </a:rPr>
+              <a:t>[,1] ~ poly(age,2)</a:t>
+            </a:r>
+          </a:p>
+        </p:txBody>
+      </p:sp>
+      <p:sp>
+        <p:nvSpPr>
+          <p:cNvPr id="9" name="TextBox 8">
+            <a:extLst>
+              <a:ext uri="{FF2B5EF4-FFF2-40B4-BE49-F238E27FC236}">
+                <a16:creationId xmlns:a16="http://schemas.microsoft.com/office/drawing/2014/main" id="{E3FF25F7-70F0-0360-62BC-C64E93AC0764}"/>
+              </a:ext>
+            </a:extLst>
+          </p:cNvPr>
+          <p:cNvSpPr txBox="1"/>
+          <p:nvPr/>
+        </p:nvSpPr>
+        <p:spPr>
+          <a:xfrm>
+            <a:off x="533400" y="4953000"/>
+            <a:ext cx="3885714" cy="646331"/>
+          </a:xfrm>
+          <a:prstGeom prst="rect">
+            <a:avLst/>
+          </a:prstGeom>
+          <a:noFill/>
+        </p:spPr>
+        <p:txBody>
+          <a:bodyPr wrap="square" rtlCol="0">
+            <a:spAutoFit/>
+          </a:bodyPr>
+          <a:lstStyle/>
+          <a:p>
+            <a:r>
+              <a:rPr lang="en-CA" dirty="0"/>
+              <a:t>But: this is NOT a model. It simply fits each set of odds separately</a:t>
+            </a:r>
+          </a:p>
+        </p:txBody>
+      </p:sp>
+    </p:spTree>
+    <p:extLst>
+      <p:ext uri="{BB962C8B-B14F-4D97-AF65-F5344CB8AC3E}">
+        <p14:creationId xmlns:p14="http://schemas.microsoft.com/office/powerpoint/2010/main" val="3070909274"/>
+      </p:ext>
+    </p:extLst>
+  </p:cSld>
+  <p:clrMapOvr>
+    <a:masterClrMapping/>
+  </p:clrMapOvr>
+</p:sld>
+</file>
+
+<file path=ppt/slides/slide45.xml><?xml version="1.0" encoding="utf-8"?>
+<p:sld xmlns:a="http://schemas.openxmlformats.org/drawingml/2006/main" xmlns:r="http://schemas.openxmlformats.org/officeDocument/2006/relationships" xmlns:p="http://schemas.openxmlformats.org/presentationml/2006/main">
+  <p:cSld>
+    <p:spTree>
+      <p:nvGrpSpPr>
+        <p:cNvPr id="1" name=""/>
+        <p:cNvGrpSpPr/>
+        <p:nvPr/>
+      </p:nvGrpSpPr>
+      <p:grpSpPr>
+        <a:xfrm>
+          <a:off x="0" y="0"/>
+          <a:ext cx="0" cy="0"/>
+          <a:chOff x="0" y="0"/>
+          <a:chExt cx="0" cy="0"/>
+        </a:xfrm>
+      </p:grpSpPr>
+      <p:sp>
+        <p:nvSpPr>
+          <p:cNvPr id="2" name="Title 1">
+            <a:extLst>
+              <a:ext uri="{FF2B5EF4-FFF2-40B4-BE49-F238E27FC236}">
+                <a16:creationId xmlns:a16="http://schemas.microsoft.com/office/drawing/2014/main" id="{62C5BF59-30EF-F05D-E649-6BF3672F2E71}"/>
+              </a:ext>
+            </a:extLst>
+          </p:cNvPr>
+          <p:cNvSpPr>
+            <a:spLocks noGrp="1"/>
+          </p:cNvSpPr>
+          <p:nvPr>
+            <p:ph type="title"/>
+          </p:nvPr>
+        </p:nvSpPr>
+        <p:spPr/>
+        <p:txBody>
+          <a:bodyPr>
+            <a:normAutofit fontScale="90000"/>
+          </a:bodyPr>
+          <a:lstStyle/>
+          <a:p>
+            <a:r>
+              <a:rPr lang="en-CA" dirty="0"/>
+              <a:t>Fitting: VGAM::</a:t>
+            </a:r>
+            <a:r>
+              <a:rPr lang="en-CA" dirty="0" err="1"/>
+              <a:t>vglm</a:t>
+            </a:r>
+            <a:r>
+              <a:rPr lang="en-CA" dirty="0"/>
+              <a:t>()</a:t>
+            </a:r>
+          </a:p>
+        </p:txBody>
+      </p:sp>
+      <p:sp>
+        <p:nvSpPr>
+          <p:cNvPr id="3" name="Slide Number Placeholder 2">
+            <a:extLst>
+              <a:ext uri="{FF2B5EF4-FFF2-40B4-BE49-F238E27FC236}">
+                <a16:creationId xmlns:a16="http://schemas.microsoft.com/office/drawing/2014/main" id="{E0113E28-46C8-2B0A-4A8E-0346D35A7DEE}"/>
+              </a:ext>
+            </a:extLst>
+          </p:cNvPr>
+          <p:cNvSpPr>
+            <a:spLocks noGrp="1"/>
+          </p:cNvSpPr>
+          <p:nvPr>
+            <p:ph type="sldNum" sz="quarter" idx="12"/>
+          </p:nvPr>
+        </p:nvSpPr>
+        <p:spPr/>
+        <p:txBody>
+          <a:bodyPr/>
+          <a:lstStyle/>
+          <a:p>
+            <a:fld id="{621225AB-15B9-4C79-A121-04D1DC7E2307}" type="slidenum">
+              <a:rPr lang="en-US" smtClean="0"/>
+              <a:t>45</a:t>
+            </a:fld>
+            <a:endParaRPr lang="en-US"/>
+          </a:p>
+        </p:txBody>
+      </p:sp>
+      <p:sp>
+        <p:nvSpPr>
+          <p:cNvPr id="4" name="TextBox 3">
+            <a:extLst>
+              <a:ext uri="{FF2B5EF4-FFF2-40B4-BE49-F238E27FC236}">
+                <a16:creationId xmlns:a16="http://schemas.microsoft.com/office/drawing/2014/main" id="{3D3748E0-EE67-9A03-F40E-7D518997FC77}"/>
+              </a:ext>
+            </a:extLst>
+          </p:cNvPr>
+          <p:cNvSpPr txBox="1"/>
+          <p:nvPr/>
+        </p:nvSpPr>
+        <p:spPr>
+          <a:xfrm>
+            <a:off x="457200" y="1219200"/>
+            <a:ext cx="8229600" cy="1200329"/>
+          </a:xfrm>
+          <a:prstGeom prst="rect">
+            <a:avLst/>
+          </a:prstGeom>
+          <a:noFill/>
+        </p:spPr>
+        <p:txBody>
+          <a:bodyPr wrap="square" rtlCol="0">
+            <a:spAutoFit/>
+          </a:bodyPr>
+          <a:lstStyle/>
+          <a:p>
+            <a:r>
+              <a:rPr lang="en-CA" dirty="0"/>
+              <a:t>VGAM::</a:t>
+            </a:r>
+            <a:r>
+              <a:rPr lang="en-CA" dirty="0" err="1"/>
+              <a:t>vglm</a:t>
+            </a:r>
+            <a:r>
+              <a:rPr lang="en-CA" dirty="0"/>
+              <a:t>() can fit a wide class of models for a vector of multivariate responses</a:t>
+            </a:r>
+          </a:p>
+          <a:p>
+            <a:pPr marL="285750" indent="-285750">
+              <a:buFont typeface="Arial" panose="020B0604020202020204" pitchFamily="34" charset="0"/>
+              <a:buChar char="•"/>
+            </a:pPr>
+            <a:r>
+              <a:rPr lang="en-CA" dirty="0"/>
+              <a:t>The family </a:t>
+            </a:r>
+            <a:r>
+              <a:rPr lang="en-CA" dirty="0">
+                <a:latin typeface="Courier New" panose="02070309020205020404" pitchFamily="49" charset="0"/>
+                <a:cs typeface="Courier New" panose="02070309020205020404" pitchFamily="49" charset="0"/>
+              </a:rPr>
+              <a:t>binom2() </a:t>
+            </a:r>
+            <a:r>
+              <a:rPr lang="en-CA" dirty="0"/>
+              <a:t>is used for bivariate logistic models</a:t>
+            </a:r>
+          </a:p>
+          <a:p>
+            <a:pPr marL="285750" indent="-285750">
+              <a:buFont typeface="Arial" panose="020B0604020202020204" pitchFamily="34" charset="0"/>
+              <a:buChar char="•"/>
+            </a:pPr>
+            <a:r>
+              <a:rPr lang="en-CA" dirty="0"/>
+              <a:t>An argument </a:t>
+            </a:r>
+            <a:r>
+              <a:rPr lang="en-CA" dirty="0">
+                <a:latin typeface="Courier New" panose="02070309020205020404" pitchFamily="49" charset="0"/>
+                <a:cs typeface="Courier New" panose="02070309020205020404" pitchFamily="49" charset="0"/>
+              </a:rPr>
+              <a:t>zero= </a:t>
+            </a:r>
+            <a:r>
+              <a:rPr lang="en-CA" dirty="0"/>
+              <a:t>allows the logit or odds ratio </a:t>
+            </a:r>
+            <a:r>
+              <a:rPr lang="en-CA" dirty="0" err="1"/>
+              <a:t>submodels</a:t>
+            </a:r>
+            <a:r>
+              <a:rPr lang="en-CA" dirty="0"/>
+              <a:t> to be constrained to intercept-only</a:t>
+            </a:r>
+          </a:p>
+        </p:txBody>
+      </p:sp>
+      <p:sp>
+        <p:nvSpPr>
+          <p:cNvPr id="5" name="TextBox 4">
+            <a:extLst>
+              <a:ext uri="{FF2B5EF4-FFF2-40B4-BE49-F238E27FC236}">
+                <a16:creationId xmlns:a16="http://schemas.microsoft.com/office/drawing/2014/main" id="{27C1961E-F035-AF54-F03A-69F38AFB587C}"/>
+              </a:ext>
+            </a:extLst>
+          </p:cNvPr>
+          <p:cNvSpPr txBox="1"/>
+          <p:nvPr/>
+        </p:nvSpPr>
+        <p:spPr>
+          <a:xfrm>
+            <a:off x="457200" y="2514600"/>
+            <a:ext cx="8229600" cy="1077218"/>
+          </a:xfrm>
+          <a:prstGeom prst="rect">
+            <a:avLst/>
+          </a:prstGeom>
+          <a:solidFill>
+            <a:schemeClr val="accent6">
+              <a:lumMod val="20000"/>
+              <a:lumOff val="80000"/>
+              <a:alpha val="60000"/>
+            </a:schemeClr>
+          </a:solidFill>
+        </p:spPr>
+        <p:txBody>
+          <a:bodyPr wrap="square" rtlCol="0">
+            <a:spAutoFit/>
+          </a:bodyPr>
+          <a:lstStyle/>
+          <a:p>
+            <a:r>
+              <a:rPr lang="en-CA" sz="1600" dirty="0" err="1">
+                <a:latin typeface="Courier New" panose="02070309020205020404" pitchFamily="49" charset="0"/>
+                <a:cs typeface="Courier New" panose="02070309020205020404" pitchFamily="49" charset="0"/>
+              </a:rPr>
+              <a:t>cm.vglm</a:t>
+            </a:r>
+            <a:r>
+              <a:rPr lang="en-CA" sz="1600" dirty="0">
+                <a:latin typeface="Courier New" panose="02070309020205020404" pitchFamily="49" charset="0"/>
+                <a:cs typeface="Courier New" panose="02070309020205020404" pitchFamily="49" charset="0"/>
+              </a:rPr>
+              <a:t> &lt;- </a:t>
+            </a:r>
+            <a:r>
+              <a:rPr lang="en-CA" sz="1600" dirty="0" err="1">
+                <a:latin typeface="Courier New" panose="02070309020205020404" pitchFamily="49" charset="0"/>
+                <a:cs typeface="Courier New" panose="02070309020205020404" pitchFamily="49" charset="0"/>
+              </a:rPr>
+              <a:t>vglm</a:t>
+            </a:r>
+            <a:r>
+              <a:rPr lang="en-CA" sz="1600" dirty="0">
+                <a:latin typeface="Courier New" panose="02070309020205020404" pitchFamily="49" charset="0"/>
+                <a:cs typeface="Courier New" panose="02070309020205020404" pitchFamily="49" charset="0"/>
+              </a:rPr>
+              <a:t>(</a:t>
+            </a:r>
+            <a:r>
+              <a:rPr lang="en-CA" sz="1600" dirty="0" err="1">
+                <a:latin typeface="Courier New" panose="02070309020205020404" pitchFamily="49" charset="0"/>
+                <a:cs typeface="Courier New" panose="02070309020205020404" pitchFamily="49" charset="0"/>
+              </a:rPr>
+              <a:t>cbind</a:t>
+            </a:r>
+            <a:r>
+              <a:rPr lang="en-CA" sz="1600" dirty="0">
+                <a:latin typeface="Courier New" panose="02070309020205020404" pitchFamily="49" charset="0"/>
+                <a:cs typeface="Courier New" panose="02070309020205020404" pitchFamily="49" charset="0"/>
+              </a:rPr>
+              <a:t>(</a:t>
+            </a:r>
+            <a:r>
+              <a:rPr lang="en-CA" sz="1600" dirty="0" err="1">
+                <a:latin typeface="Courier New" panose="02070309020205020404" pitchFamily="49" charset="0"/>
+                <a:cs typeface="Courier New" panose="02070309020205020404" pitchFamily="49" charset="0"/>
+              </a:rPr>
+              <a:t>nBnW</a:t>
+            </a:r>
+            <a:r>
+              <a:rPr lang="en-CA" sz="1600" dirty="0">
+                <a:latin typeface="Courier New" panose="02070309020205020404" pitchFamily="49" charset="0"/>
+                <a:cs typeface="Courier New" panose="02070309020205020404" pitchFamily="49" charset="0"/>
+              </a:rPr>
+              <a:t>, </a:t>
+            </a:r>
+            <a:r>
+              <a:rPr lang="en-CA" sz="1600" dirty="0" err="1">
+                <a:latin typeface="Courier New" panose="02070309020205020404" pitchFamily="49" charset="0"/>
+                <a:cs typeface="Courier New" panose="02070309020205020404" pitchFamily="49" charset="0"/>
+              </a:rPr>
+              <a:t>nBW</a:t>
+            </a:r>
+            <a:r>
+              <a:rPr lang="en-CA" sz="1600" dirty="0">
+                <a:latin typeface="Courier New" panose="02070309020205020404" pitchFamily="49" charset="0"/>
+                <a:cs typeface="Courier New" panose="02070309020205020404" pitchFamily="49" charset="0"/>
+              </a:rPr>
+              <a:t>, </a:t>
+            </a:r>
+            <a:r>
+              <a:rPr lang="en-CA" sz="1600" dirty="0" err="1">
+                <a:latin typeface="Courier New" panose="02070309020205020404" pitchFamily="49" charset="0"/>
+                <a:cs typeface="Courier New" panose="02070309020205020404" pitchFamily="49" charset="0"/>
+              </a:rPr>
+              <a:t>BnW</a:t>
+            </a:r>
+            <a:r>
+              <a:rPr lang="en-CA" sz="1600" dirty="0">
+                <a:latin typeface="Courier New" panose="02070309020205020404" pitchFamily="49" charset="0"/>
+                <a:cs typeface="Courier New" panose="02070309020205020404" pitchFamily="49" charset="0"/>
+              </a:rPr>
+              <a:t>, BW) ~ Age,</a:t>
+            </a:r>
+          </a:p>
+          <a:p>
+            <a:r>
+              <a:rPr lang="en-CA" sz="1600" dirty="0">
+                <a:latin typeface="Courier New" panose="02070309020205020404" pitchFamily="49" charset="0"/>
+                <a:cs typeface="Courier New" panose="02070309020205020404" pitchFamily="49" charset="0"/>
+              </a:rPr>
+              <a:t>                binom2.or(zero = NULL), data = coalminers)</a:t>
+            </a:r>
+          </a:p>
+          <a:p>
+            <a:endParaRPr lang="en-CA" sz="1600" dirty="0">
+              <a:latin typeface="Courier New" panose="02070309020205020404" pitchFamily="49" charset="0"/>
+              <a:cs typeface="Courier New" panose="02070309020205020404" pitchFamily="49" charset="0"/>
+            </a:endParaRPr>
+          </a:p>
+          <a:p>
+            <a:r>
+              <a:rPr lang="en-CA" sz="1600" dirty="0">
+                <a:latin typeface="Courier New" panose="02070309020205020404" pitchFamily="49" charset="0"/>
+                <a:cs typeface="Courier New" panose="02070309020205020404" pitchFamily="49" charset="0"/>
+              </a:rPr>
+              <a:t>exp(</a:t>
+            </a:r>
+            <a:r>
+              <a:rPr lang="en-CA" sz="1600" dirty="0" err="1">
+                <a:latin typeface="Courier New" panose="02070309020205020404" pitchFamily="49" charset="0"/>
+                <a:cs typeface="Courier New" panose="02070309020205020404" pitchFamily="49" charset="0"/>
+              </a:rPr>
+              <a:t>coef</a:t>
+            </a:r>
+            <a:r>
+              <a:rPr lang="en-CA" sz="1600" dirty="0">
+                <a:latin typeface="Courier New" panose="02070309020205020404" pitchFamily="49" charset="0"/>
+                <a:cs typeface="Courier New" panose="02070309020205020404" pitchFamily="49" charset="0"/>
+              </a:rPr>
+              <a:t>(</a:t>
+            </a:r>
+            <a:r>
+              <a:rPr lang="en-CA" sz="1600" dirty="0" err="1">
+                <a:latin typeface="Courier New" panose="02070309020205020404" pitchFamily="49" charset="0"/>
+                <a:cs typeface="Courier New" panose="02070309020205020404" pitchFamily="49" charset="0"/>
+              </a:rPr>
+              <a:t>cm.vglm</a:t>
+            </a:r>
+            <a:r>
+              <a:rPr lang="en-CA" sz="1600" dirty="0">
+                <a:latin typeface="Courier New" panose="02070309020205020404" pitchFamily="49" charset="0"/>
+                <a:cs typeface="Courier New" panose="02070309020205020404" pitchFamily="49" charset="0"/>
+              </a:rPr>
+              <a:t>, matrix = TRUE))</a:t>
+            </a:r>
+          </a:p>
+        </p:txBody>
+      </p:sp>
+      <p:sp>
+        <p:nvSpPr>
+          <p:cNvPr id="6" name="TextBox 5">
+            <a:extLst>
+              <a:ext uri="{FF2B5EF4-FFF2-40B4-BE49-F238E27FC236}">
+                <a16:creationId xmlns:a16="http://schemas.microsoft.com/office/drawing/2014/main" id="{A85E70EB-5250-85F1-4F91-E8A4B01118EB}"/>
+              </a:ext>
+            </a:extLst>
+          </p:cNvPr>
+          <p:cNvSpPr txBox="1"/>
+          <p:nvPr/>
+        </p:nvSpPr>
+        <p:spPr>
+          <a:xfrm>
+            <a:off x="457200" y="3810000"/>
+            <a:ext cx="8229600" cy="738664"/>
+          </a:xfrm>
+          <a:prstGeom prst="rect">
+            <a:avLst/>
+          </a:prstGeom>
+          <a:solidFill>
+            <a:schemeClr val="accent6">
+              <a:lumMod val="20000"/>
+              <a:lumOff val="80000"/>
+              <a:alpha val="60000"/>
+            </a:schemeClr>
+          </a:solidFill>
+        </p:spPr>
+        <p:txBody>
+          <a:bodyPr wrap="square" rtlCol="0">
+            <a:spAutoFit/>
+          </a:bodyPr>
+          <a:lstStyle/>
+          <a:p>
+            <a:r>
+              <a:rPr lang="en-CA" sz="1400" dirty="0">
+                <a:latin typeface="Courier New" panose="02070309020205020404" pitchFamily="49" charset="0"/>
+                <a:cs typeface="Courier New" panose="02070309020205020404" pitchFamily="49" charset="0"/>
+              </a:rPr>
+              <a:t> </a:t>
+            </a:r>
+            <a:r>
+              <a:rPr lang="en-CA" sz="1400" dirty="0" err="1">
+                <a:latin typeface="Courier New" panose="02070309020205020404" pitchFamily="49" charset="0"/>
+                <a:cs typeface="Courier New" panose="02070309020205020404" pitchFamily="49" charset="0"/>
+              </a:rPr>
+              <a:t>logitlink</a:t>
+            </a:r>
+            <a:r>
+              <a:rPr lang="en-CA" sz="1400" dirty="0">
+                <a:latin typeface="Courier New" panose="02070309020205020404" pitchFamily="49" charset="0"/>
+                <a:cs typeface="Courier New" panose="02070309020205020404" pitchFamily="49" charset="0"/>
+              </a:rPr>
+              <a:t>(mu1) </a:t>
+            </a:r>
+            <a:r>
+              <a:rPr lang="en-CA" sz="1400" dirty="0" err="1">
+                <a:latin typeface="Courier New" panose="02070309020205020404" pitchFamily="49" charset="0"/>
+                <a:cs typeface="Courier New" panose="02070309020205020404" pitchFamily="49" charset="0"/>
+              </a:rPr>
+              <a:t>logitlink</a:t>
+            </a:r>
+            <a:r>
+              <a:rPr lang="en-CA" sz="1400" dirty="0">
+                <a:latin typeface="Courier New" panose="02070309020205020404" pitchFamily="49" charset="0"/>
+                <a:cs typeface="Courier New" panose="02070309020205020404" pitchFamily="49" charset="0"/>
+              </a:rPr>
+              <a:t>(mu2) </a:t>
+            </a:r>
+            <a:r>
+              <a:rPr lang="en-CA" sz="1400" dirty="0" err="1">
+                <a:latin typeface="Courier New" panose="02070309020205020404" pitchFamily="49" charset="0"/>
+                <a:cs typeface="Courier New" panose="02070309020205020404" pitchFamily="49" charset="0"/>
+              </a:rPr>
+              <a:t>loglink</a:t>
+            </a:r>
+            <a:r>
+              <a:rPr lang="en-CA" sz="1400" dirty="0">
+                <a:latin typeface="Courier New" panose="02070309020205020404" pitchFamily="49" charset="0"/>
+                <a:cs typeface="Courier New" panose="02070309020205020404" pitchFamily="49" charset="0"/>
+              </a:rPr>
+              <a:t>(</a:t>
+            </a:r>
+            <a:r>
+              <a:rPr lang="en-CA" sz="1400" dirty="0" err="1">
+                <a:latin typeface="Courier New" panose="02070309020205020404" pitchFamily="49" charset="0"/>
+                <a:cs typeface="Courier New" panose="02070309020205020404" pitchFamily="49" charset="0"/>
+              </a:rPr>
+              <a:t>oratio</a:t>
+            </a:r>
+            <a:r>
+              <a:rPr lang="en-CA" sz="1400" dirty="0">
+                <a:latin typeface="Courier New" panose="02070309020205020404" pitchFamily="49" charset="0"/>
+                <a:cs typeface="Courier New" panose="02070309020205020404" pitchFamily="49" charset="0"/>
+              </a:rPr>
+              <a:t>)</a:t>
+            </a:r>
+          </a:p>
+          <a:p>
+            <a:r>
+              <a:rPr lang="en-CA" sz="1400" dirty="0">
+                <a:latin typeface="Courier New" panose="02070309020205020404" pitchFamily="49" charset="0"/>
+                <a:cs typeface="Courier New" panose="02070309020205020404" pitchFamily="49" charset="0"/>
+              </a:rPr>
+              <a:t>(Intercept)          0.104          0.226          20.530</a:t>
+            </a:r>
+          </a:p>
+          <a:p>
+            <a:r>
+              <a:rPr lang="en-CA" sz="1400" dirty="0">
+                <a:latin typeface="Courier New" panose="02070309020205020404" pitchFamily="49" charset="0"/>
+                <a:cs typeface="Courier New" panose="02070309020205020404" pitchFamily="49" charset="0"/>
+              </a:rPr>
+              <a:t>Age                  1.673          1.385           0.877</a:t>
+            </a:r>
+          </a:p>
+        </p:txBody>
+      </p:sp>
+      <p:sp>
+        <p:nvSpPr>
+          <p:cNvPr id="7" name="TextBox 6">
+            <a:extLst>
+              <a:ext uri="{FF2B5EF4-FFF2-40B4-BE49-F238E27FC236}">
+                <a16:creationId xmlns:a16="http://schemas.microsoft.com/office/drawing/2014/main" id="{0829077A-9B9C-92B7-C991-07B01163CE0A}"/>
+              </a:ext>
+            </a:extLst>
+          </p:cNvPr>
+          <p:cNvSpPr txBox="1"/>
+          <p:nvPr/>
+        </p:nvSpPr>
+        <p:spPr>
+          <a:xfrm>
+            <a:off x="533400" y="4876800"/>
+            <a:ext cx="8153400" cy="1200329"/>
+          </a:xfrm>
+          <a:prstGeom prst="rect">
+            <a:avLst/>
+          </a:prstGeom>
+          <a:noFill/>
+        </p:spPr>
+        <p:txBody>
+          <a:bodyPr wrap="square" rtlCol="0">
+            <a:spAutoFit/>
+          </a:bodyPr>
+          <a:lstStyle/>
+          <a:p>
+            <a:r>
+              <a:rPr lang="en-CA" dirty="0"/>
+              <a:t>Each 5 years of age:</a:t>
+            </a:r>
+          </a:p>
+          <a:p>
+            <a:pPr marL="285750" indent="-285750">
+              <a:buFont typeface="Arial" panose="020B0604020202020204" pitchFamily="34" charset="0"/>
+              <a:buChar char="•"/>
+            </a:pPr>
+            <a:r>
+              <a:rPr lang="en-CA" dirty="0"/>
+              <a:t>Multiplies odds of breathlessness by 1.67, a 67% increase</a:t>
+            </a:r>
+          </a:p>
+          <a:p>
+            <a:pPr marL="285750" indent="-285750">
+              <a:buFont typeface="Arial" panose="020B0604020202020204" pitchFamily="34" charset="0"/>
+              <a:buChar char="•"/>
+            </a:pPr>
+            <a:r>
+              <a:rPr lang="en-CA" dirty="0"/>
+              <a:t>Multiplies odds of wheeze by 1.38, a 38% increase</a:t>
+            </a:r>
+          </a:p>
+          <a:p>
+            <a:pPr marL="285750" indent="-285750">
+              <a:buFont typeface="Arial" panose="020B0604020202020204" pitchFamily="34" charset="0"/>
+              <a:buChar char="•"/>
+            </a:pPr>
+            <a:r>
+              <a:rPr lang="en-CA" dirty="0"/>
+              <a:t>Multiplies the OR for association by 0.88, a 12 % decrease</a:t>
+            </a:r>
+          </a:p>
+        </p:txBody>
+      </p:sp>
+    </p:spTree>
+    <p:extLst>
+      <p:ext uri="{BB962C8B-B14F-4D97-AF65-F5344CB8AC3E}">
+        <p14:creationId xmlns:p14="http://schemas.microsoft.com/office/powerpoint/2010/main" val="3876420177"/>
+      </p:ext>
+    </p:extLst>
+  </p:cSld>
+  <p:clrMapOvr>
+    <a:masterClrMapping/>
+  </p:clrMapOvr>
+</p:sld>
+</file>
+
+<file path=ppt/slides/slide46.xml><?xml version="1.0" encoding="utf-8"?>
+<p:sld xmlns:a="http://schemas.openxmlformats.org/drawingml/2006/main" xmlns:r="http://schemas.openxmlformats.org/officeDocument/2006/relationships" xmlns:p="http://schemas.openxmlformats.org/presentationml/2006/main">
+  <p:cSld>
+    <p:spTree>
+      <p:nvGrpSpPr>
+        <p:cNvPr id="1" name=""/>
+        <p:cNvGrpSpPr/>
+        <p:nvPr/>
+      </p:nvGrpSpPr>
+      <p:grpSpPr>
+        <a:xfrm>
+          <a:off x="0" y="0"/>
+          <a:ext cx="0" cy="0"/>
+          <a:chOff x="0" y="0"/>
+          <a:chExt cx="0" cy="0"/>
+        </a:xfrm>
+      </p:grpSpPr>
+      <p:pic>
+        <p:nvPicPr>
+          <p:cNvPr id="5" name="Picture 4">
+            <a:extLst>
+              <a:ext uri="{FF2B5EF4-FFF2-40B4-BE49-F238E27FC236}">
+                <a16:creationId xmlns:a16="http://schemas.microsoft.com/office/drawing/2014/main" id="{F3218D51-51DD-E296-59D3-9D106B48F964}"/>
+              </a:ext>
+            </a:extLst>
+          </p:cNvPr>
+          <p:cNvPicPr>
+            <a:picLocks noChangeAspect="1"/>
+          </p:cNvPicPr>
+          <p:nvPr/>
+        </p:nvPicPr>
+        <p:blipFill>
+          <a:blip r:embed="rId2"/>
+          <a:stretch>
+            <a:fillRect/>
+          </a:stretch>
+        </p:blipFill>
+        <p:spPr>
+          <a:xfrm>
+            <a:off x="4419600" y="2857644"/>
+            <a:ext cx="4422058" cy="3771756"/>
+          </a:xfrm>
+          <a:prstGeom prst="rect">
+            <a:avLst/>
+          </a:prstGeom>
+        </p:spPr>
+      </p:pic>
+      <p:sp>
+        <p:nvSpPr>
+          <p:cNvPr id="2" name="Title 1">
+            <a:extLst>
+              <a:ext uri="{FF2B5EF4-FFF2-40B4-BE49-F238E27FC236}">
+                <a16:creationId xmlns:a16="http://schemas.microsoft.com/office/drawing/2014/main" id="{65304E45-12DA-B363-3CB9-4DE1AE9BFC0C}"/>
+              </a:ext>
+            </a:extLst>
+          </p:cNvPr>
+          <p:cNvSpPr>
+            <a:spLocks noGrp="1"/>
+          </p:cNvSpPr>
+          <p:nvPr>
+            <p:ph type="title"/>
+          </p:nvPr>
+        </p:nvSpPr>
+        <p:spPr/>
+        <p:txBody>
+          <a:bodyPr>
+            <a:normAutofit fontScale="90000"/>
+          </a:bodyPr>
+          <a:lstStyle/>
+          <a:p>
+            <a:r>
+              <a:rPr lang="en-CA" dirty="0"/>
+              <a:t>Plotting the model fit</a:t>
+            </a:r>
+          </a:p>
+        </p:txBody>
+      </p:sp>
+      <p:sp>
+        <p:nvSpPr>
+          <p:cNvPr id="3" name="Slide Number Placeholder 2">
+            <a:extLst>
+              <a:ext uri="{FF2B5EF4-FFF2-40B4-BE49-F238E27FC236}">
+                <a16:creationId xmlns:a16="http://schemas.microsoft.com/office/drawing/2014/main" id="{AA0EF58A-D89A-1D95-0C9C-2FCB2166C585}"/>
+              </a:ext>
+            </a:extLst>
+          </p:cNvPr>
+          <p:cNvSpPr>
+            <a:spLocks noGrp="1"/>
+          </p:cNvSpPr>
+          <p:nvPr>
+            <p:ph type="sldNum" sz="quarter" idx="12"/>
+          </p:nvPr>
+        </p:nvSpPr>
+        <p:spPr/>
+        <p:txBody>
+          <a:bodyPr/>
+          <a:lstStyle/>
+          <a:p>
+            <a:fld id="{621225AB-15B9-4C79-A121-04D1DC7E2307}" type="slidenum">
+              <a:rPr lang="en-US" smtClean="0"/>
+              <a:t>46</a:t>
+            </a:fld>
+            <a:endParaRPr lang="en-US"/>
+          </a:p>
+        </p:txBody>
+      </p:sp>
+      <p:sp>
+        <p:nvSpPr>
+          <p:cNvPr id="6" name="TextBox 5">
+            <a:extLst>
+              <a:ext uri="{FF2B5EF4-FFF2-40B4-BE49-F238E27FC236}">
+                <a16:creationId xmlns:a16="http://schemas.microsoft.com/office/drawing/2014/main" id="{7745473C-187E-0F6F-B0B3-87CC619A0A96}"/>
+              </a:ext>
+            </a:extLst>
+          </p:cNvPr>
+          <p:cNvSpPr txBox="1"/>
+          <p:nvPr/>
+        </p:nvSpPr>
+        <p:spPr>
+          <a:xfrm>
+            <a:off x="457200" y="1143000"/>
+            <a:ext cx="8229600" cy="646331"/>
+          </a:xfrm>
+          <a:prstGeom prst="rect">
+            <a:avLst/>
+          </a:prstGeom>
+          <a:noFill/>
+        </p:spPr>
+        <p:txBody>
+          <a:bodyPr wrap="square" rtlCol="0">
+            <a:spAutoFit/>
+          </a:bodyPr>
+          <a:lstStyle/>
+          <a:p>
+            <a:r>
+              <a:rPr lang="en-CA" dirty="0"/>
+              <a:t>VGAM::fitted() returns the </a:t>
+            </a:r>
+            <a:r>
+              <a:rPr lang="en-CA" dirty="0">
+                <a:solidFill>
+                  <a:srgbClr val="0070C0"/>
+                </a:solidFill>
+              </a:rPr>
+              <a:t>fitted</a:t>
+            </a:r>
+            <a:r>
+              <a:rPr lang="en-CA" dirty="0"/>
+              <a:t> values on the probability scale</a:t>
+            </a:r>
+          </a:p>
+          <a:p>
+            <a:r>
+              <a:rPr lang="en-CA" dirty="0"/>
+              <a:t>VGAM::</a:t>
+            </a:r>
+            <a:r>
+              <a:rPr lang="en-CA" dirty="0" err="1"/>
+              <a:t>depvar</a:t>
+            </a:r>
+            <a:r>
+              <a:rPr lang="en-CA" dirty="0"/>
+              <a:t>() returns the </a:t>
+            </a:r>
+            <a:r>
+              <a:rPr lang="en-CA" dirty="0">
+                <a:solidFill>
+                  <a:srgbClr val="0070C0"/>
+                </a:solidFill>
+              </a:rPr>
+              <a:t>observed</a:t>
+            </a:r>
+            <a:r>
+              <a:rPr lang="en-CA" dirty="0"/>
+              <a:t> values on the probability scale</a:t>
+            </a:r>
+          </a:p>
+        </p:txBody>
+      </p:sp>
+      <p:sp>
+        <p:nvSpPr>
+          <p:cNvPr id="8" name="TextBox 7">
+            <a:extLst>
+              <a:ext uri="{FF2B5EF4-FFF2-40B4-BE49-F238E27FC236}">
+                <a16:creationId xmlns:a16="http://schemas.microsoft.com/office/drawing/2014/main" id="{90F7BBA9-DB09-57D5-4481-657B1C51912A}"/>
+              </a:ext>
+            </a:extLst>
+          </p:cNvPr>
+          <p:cNvSpPr txBox="1"/>
+          <p:nvPr/>
+        </p:nvSpPr>
+        <p:spPr>
+          <a:xfrm>
+            <a:off x="533400" y="2133600"/>
+            <a:ext cx="3662905" cy="2462213"/>
+          </a:xfrm>
+          <a:prstGeom prst="rect">
+            <a:avLst/>
+          </a:prstGeom>
+          <a:solidFill>
+            <a:schemeClr val="accent6">
+              <a:lumMod val="20000"/>
+              <a:lumOff val="80000"/>
+              <a:alpha val="60000"/>
+            </a:schemeClr>
+          </a:solidFill>
+        </p:spPr>
+        <p:txBody>
+          <a:bodyPr wrap="square" rtlCol="0">
+            <a:spAutoFit/>
+          </a:bodyPr>
+          <a:lstStyle/>
+          <a:p>
+            <a:r>
+              <a:rPr lang="en-CA" sz="1400" dirty="0">
+                <a:latin typeface="Courier New" panose="02070309020205020404" pitchFamily="49" charset="0"/>
+                <a:cs typeface="Courier New" panose="02070309020205020404" pitchFamily="49" charset="0"/>
+              </a:rPr>
+              <a:t>&gt; P &lt;- fitted(</a:t>
+            </a:r>
+            <a:r>
+              <a:rPr lang="en-CA" sz="1400" dirty="0" err="1">
+                <a:latin typeface="Courier New" panose="02070309020205020404" pitchFamily="49" charset="0"/>
+                <a:cs typeface="Courier New" panose="02070309020205020404" pitchFamily="49" charset="0"/>
+              </a:rPr>
+              <a:t>cm.vglm</a:t>
+            </a:r>
+            <a:r>
+              <a:rPr lang="en-CA" sz="1400" dirty="0">
+                <a:latin typeface="Courier New" panose="02070309020205020404" pitchFamily="49" charset="0"/>
+                <a:cs typeface="Courier New" panose="02070309020205020404" pitchFamily="49" charset="0"/>
+              </a:rPr>
+              <a:t>)  </a:t>
+            </a:r>
+          </a:p>
+          <a:p>
+            <a:r>
+              <a:rPr lang="en-CA" sz="1400" dirty="0">
+                <a:latin typeface="Courier New" panose="02070309020205020404" pitchFamily="49" charset="0"/>
+                <a:cs typeface="Courier New" panose="02070309020205020404" pitchFamily="49" charset="0"/>
+              </a:rPr>
+              <a:t>&gt; </a:t>
+            </a:r>
+            <a:r>
+              <a:rPr lang="en-CA" sz="1400" dirty="0" err="1">
+                <a:latin typeface="Courier New" panose="02070309020205020404" pitchFamily="49" charset="0"/>
+                <a:cs typeface="Courier New" panose="02070309020205020404" pitchFamily="49" charset="0"/>
+              </a:rPr>
+              <a:t>colnames</a:t>
+            </a:r>
+            <a:r>
+              <a:rPr lang="en-CA" sz="1400" dirty="0">
+                <a:latin typeface="Courier New" panose="02070309020205020404" pitchFamily="49" charset="0"/>
+                <a:cs typeface="Courier New" panose="02070309020205020404" pitchFamily="49" charset="0"/>
+              </a:rPr>
+              <a:t>(P) &lt;- c("</a:t>
+            </a:r>
+            <a:r>
+              <a:rPr lang="en-CA" sz="1400" dirty="0" err="1">
+                <a:latin typeface="Courier New" panose="02070309020205020404" pitchFamily="49" charset="0"/>
+                <a:cs typeface="Courier New" panose="02070309020205020404" pitchFamily="49" charset="0"/>
+              </a:rPr>
+              <a:t>bw</a:t>
+            </a:r>
+            <a:r>
+              <a:rPr lang="en-CA" sz="1400" dirty="0">
+                <a:latin typeface="Courier New" panose="02070309020205020404" pitchFamily="49" charset="0"/>
+                <a:cs typeface="Courier New" panose="02070309020205020404" pitchFamily="49" charset="0"/>
+              </a:rPr>
+              <a:t>", "</a:t>
+            </a:r>
+            <a:r>
+              <a:rPr lang="en-CA" sz="1400" dirty="0" err="1">
+                <a:latin typeface="Courier New" panose="02070309020205020404" pitchFamily="49" charset="0"/>
+                <a:cs typeface="Courier New" panose="02070309020205020404" pitchFamily="49" charset="0"/>
+              </a:rPr>
+              <a:t>bW</a:t>
+            </a:r>
+            <a:r>
+              <a:rPr lang="en-CA" sz="1400" dirty="0">
+                <a:latin typeface="Courier New" panose="02070309020205020404" pitchFamily="49" charset="0"/>
+                <a:cs typeface="Courier New" panose="02070309020205020404" pitchFamily="49" charset="0"/>
+              </a:rPr>
+              <a:t>", </a:t>
+            </a:r>
+          </a:p>
+          <a:p>
+            <a:r>
+              <a:rPr lang="en-CA" sz="1400" dirty="0">
+                <a:latin typeface="Courier New" panose="02070309020205020404" pitchFamily="49" charset="0"/>
+                <a:cs typeface="Courier New" panose="02070309020205020404" pitchFamily="49" charset="0"/>
+              </a:rPr>
+              <a:t>                   "</a:t>
+            </a:r>
+            <a:r>
+              <a:rPr lang="en-CA" sz="1400" dirty="0" err="1">
+                <a:latin typeface="Courier New" panose="02070309020205020404" pitchFamily="49" charset="0"/>
+                <a:cs typeface="Courier New" panose="02070309020205020404" pitchFamily="49" charset="0"/>
+              </a:rPr>
+              <a:t>Bw</a:t>
+            </a:r>
+            <a:r>
+              <a:rPr lang="en-CA" sz="1400" dirty="0">
+                <a:latin typeface="Courier New" panose="02070309020205020404" pitchFamily="49" charset="0"/>
+                <a:cs typeface="Courier New" panose="02070309020205020404" pitchFamily="49" charset="0"/>
+              </a:rPr>
+              <a:t>", "BW")</a:t>
+            </a:r>
+          </a:p>
+          <a:p>
+            <a:r>
+              <a:rPr lang="en-CA" sz="1400" dirty="0">
+                <a:latin typeface="Courier New" panose="02070309020205020404" pitchFamily="49" charset="0"/>
+                <a:cs typeface="Courier New" panose="02070309020205020404" pitchFamily="49" charset="0"/>
+              </a:rPr>
+              <a:t>&gt; P</a:t>
+            </a:r>
+          </a:p>
+          <a:p>
+            <a:r>
+              <a:rPr lang="en-CA" sz="1400" dirty="0">
+                <a:latin typeface="Courier New" panose="02070309020205020404" pitchFamily="49" charset="0"/>
+                <a:cs typeface="Courier New" panose="02070309020205020404" pitchFamily="49" charset="0"/>
+              </a:rPr>
+              <a:t> </a:t>
+            </a:r>
+            <a:r>
+              <a:rPr lang="en-CA" sz="1400" dirty="0" err="1">
+                <a:latin typeface="Courier New" panose="02070309020205020404" pitchFamily="49" charset="0"/>
+                <a:cs typeface="Courier New" panose="02070309020205020404" pitchFamily="49" charset="0"/>
+              </a:rPr>
+              <a:t>bw</a:t>
+            </a:r>
+            <a:r>
+              <a:rPr lang="en-CA" sz="1400" dirty="0">
+                <a:latin typeface="Courier New" panose="02070309020205020404" pitchFamily="49" charset="0"/>
+                <a:cs typeface="Courier New" panose="02070309020205020404" pitchFamily="49" charset="0"/>
+              </a:rPr>
+              <a:t>    </a:t>
+            </a:r>
+            <a:r>
+              <a:rPr lang="en-CA" sz="1400" dirty="0" err="1">
+                <a:latin typeface="Courier New" panose="02070309020205020404" pitchFamily="49" charset="0"/>
+                <a:cs typeface="Courier New" panose="02070309020205020404" pitchFamily="49" charset="0"/>
+              </a:rPr>
+              <a:t>bW</a:t>
+            </a:r>
+            <a:r>
+              <a:rPr lang="en-CA" sz="1400" dirty="0">
+                <a:latin typeface="Courier New" panose="02070309020205020404" pitchFamily="49" charset="0"/>
+                <a:cs typeface="Courier New" panose="02070309020205020404" pitchFamily="49" charset="0"/>
+              </a:rPr>
+              <a:t>     </a:t>
+            </a:r>
+            <a:r>
+              <a:rPr lang="en-CA" sz="1400" dirty="0" err="1">
+                <a:latin typeface="Courier New" panose="02070309020205020404" pitchFamily="49" charset="0"/>
+                <a:cs typeface="Courier New" panose="02070309020205020404" pitchFamily="49" charset="0"/>
+              </a:rPr>
+              <a:t>Bw</a:t>
+            </a:r>
+            <a:r>
+              <a:rPr lang="en-CA" sz="1400" dirty="0">
+                <a:latin typeface="Courier New" panose="02070309020205020404" pitchFamily="49" charset="0"/>
+                <a:cs typeface="Courier New" panose="02070309020205020404" pitchFamily="49" charset="0"/>
+              </a:rPr>
+              <a:t>     BW</a:t>
+            </a:r>
+          </a:p>
+          <a:p>
+            <a:r>
+              <a:rPr lang="en-CA" sz="1400" dirty="0">
+                <a:latin typeface="Courier New" panose="02070309020205020404" pitchFamily="49" charset="0"/>
+                <a:cs typeface="Courier New" panose="02070309020205020404" pitchFamily="49" charset="0"/>
+              </a:rPr>
+              <a:t>1 0.94 0.049 0.0046 0.0085</a:t>
+            </a:r>
+          </a:p>
+          <a:p>
+            <a:r>
+              <a:rPr lang="en-CA" sz="1400" dirty="0">
+                <a:latin typeface="Courier New" panose="02070309020205020404" pitchFamily="49" charset="0"/>
+                <a:cs typeface="Courier New" panose="02070309020205020404" pitchFamily="49" charset="0"/>
+              </a:rPr>
+              <a:t>2 0.91 0.064 0.0070 0.0148</a:t>
+            </a:r>
+          </a:p>
+          <a:p>
+            <a:r>
+              <a:rPr lang="en-CA" sz="1400" dirty="0">
+                <a:latin typeface="Courier New" panose="02070309020205020404" pitchFamily="49" charset="0"/>
+                <a:cs typeface="Courier New" panose="02070309020205020404" pitchFamily="49" charset="0"/>
+              </a:rPr>
+              <a:t>3 0.88 0.080 0.0105 0.0254</a:t>
+            </a:r>
+          </a:p>
+          <a:p>
+            <a:r>
+              <a:rPr lang="en-CA" sz="1400" dirty="0">
+                <a:latin typeface="Courier New" panose="02070309020205020404" pitchFamily="49" charset="0"/>
+                <a:cs typeface="Courier New" panose="02070309020205020404" pitchFamily="49" charset="0"/>
+              </a:rPr>
+              <a:t>4 0.84 0.097 0.0158 0.0428</a:t>
+            </a:r>
+          </a:p>
+          <a:p>
+            <a:r>
+              <a:rPr lang="en-CA" sz="1400" dirty="0">
+                <a:latin typeface="Courier New" panose="02070309020205020404" pitchFamily="49" charset="0"/>
+                <a:cs typeface="Courier New" panose="02070309020205020404" pitchFamily="49" charset="0"/>
+              </a:rPr>
+              <a:t>5 0.79 0.114 0.0239 0.0704</a:t>
+            </a:r>
+          </a:p>
+          <a:p>
+            <a:r>
+              <a:rPr lang="en-CA" sz="1400" dirty="0">
+                <a:latin typeface="Courier New" panose="02070309020205020404" pitchFamily="49" charset="0"/>
+                <a:cs typeface="Courier New" panose="02070309020205020404" pitchFamily="49" charset="0"/>
+              </a:rPr>
+              <a:t>  …</a:t>
+            </a:r>
+          </a:p>
+        </p:txBody>
+      </p:sp>
+      <p:sp>
+        <p:nvSpPr>
+          <p:cNvPr id="9" name="TextBox 8">
+            <a:extLst>
+              <a:ext uri="{FF2B5EF4-FFF2-40B4-BE49-F238E27FC236}">
+                <a16:creationId xmlns:a16="http://schemas.microsoft.com/office/drawing/2014/main" id="{5088BC33-7199-5456-A5B6-DA4F48499ABE}"/>
+              </a:ext>
+            </a:extLst>
+          </p:cNvPr>
+          <p:cNvSpPr txBox="1"/>
+          <p:nvPr/>
+        </p:nvSpPr>
+        <p:spPr>
+          <a:xfrm>
+            <a:off x="457200" y="4724400"/>
+            <a:ext cx="4114800" cy="646331"/>
+          </a:xfrm>
+          <a:prstGeom prst="rect">
+            <a:avLst/>
+          </a:prstGeom>
+          <a:noFill/>
+        </p:spPr>
+        <p:txBody>
+          <a:bodyPr wrap="square" rtlCol="0">
+            <a:spAutoFit/>
+          </a:bodyPr>
+          <a:lstStyle/>
+          <a:p>
+            <a:r>
+              <a:rPr lang="en-CA" dirty="0"/>
+              <a:t>You can get these on the logit scale using the inverse logit function, </a:t>
+            </a:r>
+            <a:r>
+              <a:rPr lang="en-CA" dirty="0" err="1"/>
+              <a:t>qlogis</a:t>
+            </a:r>
+            <a:r>
+              <a:rPr lang="en-CA" dirty="0"/>
+              <a:t>()</a:t>
+            </a:r>
+          </a:p>
+        </p:txBody>
+      </p:sp>
+      <p:sp>
+        <p:nvSpPr>
+          <p:cNvPr id="10" name="TextBox 9">
+            <a:extLst>
+              <a:ext uri="{FF2B5EF4-FFF2-40B4-BE49-F238E27FC236}">
+                <a16:creationId xmlns:a16="http://schemas.microsoft.com/office/drawing/2014/main" id="{E6CA3B73-F495-1076-CEDD-0E4642FF43FD}"/>
+              </a:ext>
+            </a:extLst>
+          </p:cNvPr>
+          <p:cNvSpPr txBox="1"/>
+          <p:nvPr/>
+        </p:nvSpPr>
+        <p:spPr>
+          <a:xfrm>
+            <a:off x="533400" y="5638800"/>
+            <a:ext cx="3662905" cy="584775"/>
+          </a:xfrm>
+          <a:prstGeom prst="rect">
+            <a:avLst/>
+          </a:prstGeom>
+          <a:solidFill>
+            <a:schemeClr val="accent6">
+              <a:lumMod val="20000"/>
+              <a:lumOff val="80000"/>
+              <a:alpha val="60000"/>
+            </a:schemeClr>
+          </a:solidFill>
+        </p:spPr>
+        <p:txBody>
+          <a:bodyPr wrap="square" rtlCol="0">
+            <a:spAutoFit/>
+          </a:bodyPr>
+          <a:lstStyle/>
+          <a:p>
+            <a:r>
+              <a:rPr lang="en-CA" sz="1600" dirty="0">
+                <a:latin typeface="Courier New" panose="02070309020205020404" pitchFamily="49" charset="0"/>
+                <a:cs typeface="Courier New" panose="02070309020205020404" pitchFamily="49" charset="0"/>
+              </a:rPr>
+              <a:t>LP &lt;- </a:t>
+            </a:r>
+            <a:r>
+              <a:rPr lang="en-CA" sz="1600" dirty="0" err="1">
+                <a:latin typeface="Courier New" panose="02070309020205020404" pitchFamily="49" charset="0"/>
+                <a:cs typeface="Courier New" panose="02070309020205020404" pitchFamily="49" charset="0"/>
+              </a:rPr>
+              <a:t>qlogis</a:t>
+            </a:r>
+            <a:r>
+              <a:rPr lang="en-CA" sz="1600" dirty="0">
+                <a:latin typeface="Courier New" panose="02070309020205020404" pitchFamily="49" charset="0"/>
+                <a:cs typeface="Courier New" panose="02070309020205020404" pitchFamily="49" charset="0"/>
+              </a:rPr>
+              <a:t>(P)</a:t>
+            </a:r>
+          </a:p>
+          <a:p>
+            <a:r>
+              <a:rPr lang="en-CA" sz="1600" dirty="0">
+                <a:latin typeface="Courier New" panose="02070309020205020404" pitchFamily="49" charset="0"/>
+                <a:cs typeface="Courier New" panose="02070309020205020404" pitchFamily="49" charset="0"/>
+              </a:rPr>
+              <a:t>LY &lt;- </a:t>
+            </a:r>
+            <a:r>
+              <a:rPr lang="en-CA" sz="1600" dirty="0" err="1">
+                <a:latin typeface="Courier New" panose="02070309020205020404" pitchFamily="49" charset="0"/>
+                <a:cs typeface="Courier New" panose="02070309020205020404" pitchFamily="49" charset="0"/>
+              </a:rPr>
+              <a:t>qlogis</a:t>
+            </a:r>
+            <a:r>
+              <a:rPr lang="en-CA" sz="1600" dirty="0">
+                <a:latin typeface="Courier New" panose="02070309020205020404" pitchFamily="49" charset="0"/>
+                <a:cs typeface="Courier New" panose="02070309020205020404" pitchFamily="49" charset="0"/>
+              </a:rPr>
+              <a:t>(Y)</a:t>
+            </a:r>
+          </a:p>
+        </p:txBody>
+      </p:sp>
+      <p:sp>
+        <p:nvSpPr>
+          <p:cNvPr id="11" name="TextBox 10">
+            <a:extLst>
+              <a:ext uri="{FF2B5EF4-FFF2-40B4-BE49-F238E27FC236}">
+                <a16:creationId xmlns:a16="http://schemas.microsoft.com/office/drawing/2014/main" id="{2920B6FA-E8E8-413A-6CD8-155EF8FBCFDA}"/>
+              </a:ext>
+            </a:extLst>
+          </p:cNvPr>
+          <p:cNvSpPr txBox="1"/>
+          <p:nvPr/>
+        </p:nvSpPr>
+        <p:spPr>
+          <a:xfrm>
+            <a:off x="4572000" y="2123768"/>
+            <a:ext cx="3962400" cy="369332"/>
+          </a:xfrm>
+          <a:prstGeom prst="rect">
+            <a:avLst/>
+          </a:prstGeom>
+          <a:noFill/>
+        </p:spPr>
+        <p:txBody>
+          <a:bodyPr wrap="square" rtlCol="0">
+            <a:spAutoFit/>
+          </a:bodyPr>
+          <a:lstStyle/>
+          <a:p>
+            <a:r>
+              <a:rPr lang="en-CA" dirty="0"/>
+              <a:t>The plot is made using </a:t>
+            </a:r>
+            <a:r>
+              <a:rPr lang="en-CA" dirty="0" err="1"/>
+              <a:t>matplot</a:t>
+            </a:r>
+            <a:r>
+              <a:rPr lang="en-CA" dirty="0"/>
+              <a:t>()</a:t>
+            </a:r>
+          </a:p>
+        </p:txBody>
+      </p:sp>
+    </p:spTree>
+    <p:extLst>
+      <p:ext uri="{BB962C8B-B14F-4D97-AF65-F5344CB8AC3E}">
+        <p14:creationId xmlns:p14="http://schemas.microsoft.com/office/powerpoint/2010/main" val="590267117"/>
+      </p:ext>
+    </p:extLst>
+  </p:cSld>
+  <p:clrMapOvr>
+    <a:masterClrMapping/>
+  </p:clrMapOvr>
+</p:sld>
+</file>
+
+<file path=ppt/slides/slide47.xml><?xml version="1.0" encoding="utf-8"?>
+<p:sld xmlns:a="http://schemas.openxmlformats.org/drawingml/2006/main" xmlns:r="http://schemas.openxmlformats.org/officeDocument/2006/relationships" xmlns:p="http://schemas.openxmlformats.org/presentationml/2006/main">
+  <p:cSld>
+    <p:spTree>
+      <p:nvGrpSpPr>
+        <p:cNvPr id="1" name=""/>
+        <p:cNvGrpSpPr/>
+        <p:nvPr/>
+      </p:nvGrpSpPr>
+      <p:grpSpPr>
+        <a:xfrm>
+          <a:off x="0" y="0"/>
+          <a:ext cx="0" cy="0"/>
+          <a:chOff x="0" y="0"/>
+          <a:chExt cx="0" cy="0"/>
+        </a:xfrm>
+      </p:grpSpPr>
+      <p:sp>
+        <p:nvSpPr>
+          <p:cNvPr id="2" name="Title 1">
+            <a:extLst>
+              <a:ext uri="{FF2B5EF4-FFF2-40B4-BE49-F238E27FC236}">
+                <a16:creationId xmlns:a16="http://schemas.microsoft.com/office/drawing/2014/main" id="{6128D1C3-5B64-D13C-6C2C-BBDC0FF9CE35}"/>
+              </a:ext>
+            </a:extLst>
+          </p:cNvPr>
+          <p:cNvSpPr>
+            <a:spLocks noGrp="1"/>
+          </p:cNvSpPr>
+          <p:nvPr>
+            <p:ph type="title"/>
+          </p:nvPr>
+        </p:nvSpPr>
+        <p:spPr/>
+        <p:txBody>
+          <a:bodyPr>
+            <a:normAutofit fontScale="90000"/>
+          </a:bodyPr>
+          <a:lstStyle/>
+          <a:p>
+            <a:r>
+              <a:rPr lang="en-CA" dirty="0"/>
+              <a:t>Other possibilities</a:t>
+            </a:r>
+          </a:p>
+        </p:txBody>
+      </p:sp>
+      <p:sp>
+        <p:nvSpPr>
+          <p:cNvPr id="3" name="Slide Number Placeholder 2">
+            <a:extLst>
+              <a:ext uri="{FF2B5EF4-FFF2-40B4-BE49-F238E27FC236}">
+                <a16:creationId xmlns:a16="http://schemas.microsoft.com/office/drawing/2014/main" id="{B5584BBA-EA5E-CE0B-6CCE-E18A3BD4F537}"/>
+              </a:ext>
+            </a:extLst>
+          </p:cNvPr>
+          <p:cNvSpPr>
+            <a:spLocks noGrp="1"/>
+          </p:cNvSpPr>
+          <p:nvPr>
+            <p:ph type="sldNum" sz="quarter" idx="12"/>
+          </p:nvPr>
+        </p:nvSpPr>
+        <p:spPr/>
+        <p:txBody>
+          <a:bodyPr/>
+          <a:lstStyle/>
+          <a:p>
+            <a:fld id="{621225AB-15B9-4C79-A121-04D1DC7E2307}" type="slidenum">
+              <a:rPr lang="en-US" smtClean="0"/>
+              <a:t>47</a:t>
+            </a:fld>
+            <a:endParaRPr lang="en-US"/>
+          </a:p>
+        </p:txBody>
+      </p:sp>
+      <p:sp>
+        <p:nvSpPr>
+          <p:cNvPr id="4" name="TextBox 3">
+            <a:extLst>
+              <a:ext uri="{FF2B5EF4-FFF2-40B4-BE49-F238E27FC236}">
+                <a16:creationId xmlns:a16="http://schemas.microsoft.com/office/drawing/2014/main" id="{CBB14D2A-09D0-1E4D-35D8-79AE1D92E442}"/>
+              </a:ext>
+            </a:extLst>
+          </p:cNvPr>
+          <p:cNvSpPr txBox="1"/>
+          <p:nvPr/>
+        </p:nvSpPr>
+        <p:spPr>
+          <a:xfrm>
+            <a:off x="457200" y="1752600"/>
+            <a:ext cx="8229600" cy="646331"/>
+          </a:xfrm>
+          <a:prstGeom prst="rect">
+            <a:avLst/>
+          </a:prstGeom>
+          <a:solidFill>
+            <a:schemeClr val="accent6">
+              <a:lumMod val="20000"/>
+              <a:lumOff val="80000"/>
+              <a:alpha val="60000"/>
+            </a:schemeClr>
+          </a:solidFill>
+        </p:spPr>
+        <p:txBody>
+          <a:bodyPr wrap="square" rtlCol="0">
+            <a:spAutoFit/>
+          </a:bodyPr>
+          <a:lstStyle/>
+          <a:p>
+            <a:r>
+              <a:rPr lang="en-CA" dirty="0"/>
+              <a:t>cm.vglm2 &lt;- </a:t>
+            </a:r>
+            <a:r>
+              <a:rPr lang="en-CA" dirty="0" err="1"/>
+              <a:t>vglm</a:t>
+            </a:r>
+            <a:r>
+              <a:rPr lang="en-CA" dirty="0"/>
+              <a:t>(</a:t>
+            </a:r>
+            <a:r>
+              <a:rPr lang="en-CA" dirty="0" err="1"/>
+              <a:t>cbind</a:t>
+            </a:r>
+            <a:r>
+              <a:rPr lang="en-CA" dirty="0"/>
+              <a:t>(</a:t>
+            </a:r>
+            <a:r>
+              <a:rPr lang="en-CA" dirty="0" err="1"/>
+              <a:t>nBnW</a:t>
+            </a:r>
+            <a:r>
+              <a:rPr lang="en-CA" dirty="0"/>
+              <a:t>, </a:t>
+            </a:r>
+            <a:r>
+              <a:rPr lang="en-CA" dirty="0" err="1"/>
+              <a:t>nBW</a:t>
+            </a:r>
+            <a:r>
+              <a:rPr lang="en-CA" dirty="0"/>
+              <a:t>, </a:t>
+            </a:r>
+            <a:r>
+              <a:rPr lang="en-CA" dirty="0" err="1"/>
+              <a:t>BnW</a:t>
+            </a:r>
+            <a:r>
+              <a:rPr lang="en-CA" dirty="0"/>
+              <a:t>, BW) ~ poly(Age,2),</a:t>
+            </a:r>
+          </a:p>
+          <a:p>
+            <a:r>
+              <a:rPr lang="en-CA" dirty="0"/>
+              <a:t>                binom2.or(zero = NULL), data = coalminers)</a:t>
+            </a:r>
+          </a:p>
+        </p:txBody>
+      </p:sp>
+      <p:sp>
+        <p:nvSpPr>
+          <p:cNvPr id="5" name="TextBox 4">
+            <a:extLst>
+              <a:ext uri="{FF2B5EF4-FFF2-40B4-BE49-F238E27FC236}">
+                <a16:creationId xmlns:a16="http://schemas.microsoft.com/office/drawing/2014/main" id="{F4610618-20DC-04A6-D903-33FF80EF0FA8}"/>
+              </a:ext>
+            </a:extLst>
+          </p:cNvPr>
+          <p:cNvSpPr txBox="1"/>
+          <p:nvPr/>
+        </p:nvSpPr>
+        <p:spPr>
+          <a:xfrm>
+            <a:off x="533400" y="3316069"/>
+            <a:ext cx="8153400" cy="646331"/>
+          </a:xfrm>
+          <a:prstGeom prst="rect">
+            <a:avLst/>
+          </a:prstGeom>
+          <a:solidFill>
+            <a:schemeClr val="accent6">
+              <a:lumMod val="20000"/>
+              <a:lumOff val="80000"/>
+              <a:alpha val="60000"/>
+            </a:schemeClr>
+          </a:solidFill>
+        </p:spPr>
+        <p:txBody>
+          <a:bodyPr wrap="square" rtlCol="0">
+            <a:spAutoFit/>
+          </a:bodyPr>
+          <a:lstStyle/>
+          <a:p>
+            <a:r>
+              <a:rPr lang="en-CA" dirty="0" err="1"/>
+              <a:t>cm.vgam</a:t>
+            </a:r>
+            <a:r>
+              <a:rPr lang="en-CA" dirty="0"/>
+              <a:t> &lt;- </a:t>
+            </a:r>
+            <a:r>
+              <a:rPr lang="en-CA" dirty="0" err="1"/>
+              <a:t>vgam</a:t>
+            </a:r>
+            <a:r>
+              <a:rPr lang="en-CA" dirty="0"/>
+              <a:t>(</a:t>
+            </a:r>
+            <a:r>
+              <a:rPr lang="en-CA" dirty="0" err="1"/>
+              <a:t>cbind</a:t>
+            </a:r>
+            <a:r>
+              <a:rPr lang="en-CA" dirty="0"/>
+              <a:t>(</a:t>
+            </a:r>
+            <a:r>
+              <a:rPr lang="en-CA" dirty="0" err="1"/>
+              <a:t>nBnW</a:t>
+            </a:r>
+            <a:r>
+              <a:rPr lang="en-CA" dirty="0"/>
+              <a:t>, </a:t>
+            </a:r>
+            <a:r>
+              <a:rPr lang="en-CA" dirty="0" err="1"/>
+              <a:t>nBW</a:t>
+            </a:r>
+            <a:r>
+              <a:rPr lang="en-CA" dirty="0"/>
+              <a:t>, </a:t>
+            </a:r>
+            <a:r>
+              <a:rPr lang="en-CA" dirty="0" err="1"/>
+              <a:t>BnW</a:t>
+            </a:r>
+            <a:r>
+              <a:rPr lang="en-CA" dirty="0"/>
+              <a:t>, BW) ~ s(Age, </a:t>
+            </a:r>
+            <a:r>
+              <a:rPr lang="en-CA" dirty="0" err="1"/>
+              <a:t>df</a:t>
+            </a:r>
+            <a:r>
+              <a:rPr lang="en-CA" dirty="0"/>
+              <a:t> = 2),</a:t>
+            </a:r>
+          </a:p>
+          <a:p>
+            <a:r>
+              <a:rPr lang="en-CA" dirty="0"/>
+              <a:t>                 binom2.or(zero = NULL), data = coalminers)</a:t>
+            </a:r>
+          </a:p>
+        </p:txBody>
+      </p:sp>
+      <p:sp>
+        <p:nvSpPr>
+          <p:cNvPr id="6" name="TextBox 5">
+            <a:extLst>
+              <a:ext uri="{FF2B5EF4-FFF2-40B4-BE49-F238E27FC236}">
+                <a16:creationId xmlns:a16="http://schemas.microsoft.com/office/drawing/2014/main" id="{AFB4B82A-BA00-880D-6C39-A26D597B4EF1}"/>
+              </a:ext>
+            </a:extLst>
+          </p:cNvPr>
+          <p:cNvSpPr txBox="1"/>
+          <p:nvPr/>
+        </p:nvSpPr>
+        <p:spPr>
+          <a:xfrm>
+            <a:off x="457200" y="1143000"/>
+            <a:ext cx="8229600" cy="369332"/>
+          </a:xfrm>
+          <a:prstGeom prst="rect">
+            <a:avLst/>
+          </a:prstGeom>
+          <a:noFill/>
+        </p:spPr>
+        <p:txBody>
+          <a:bodyPr wrap="square" rtlCol="0">
+            <a:spAutoFit/>
+          </a:bodyPr>
+          <a:lstStyle/>
+          <a:p>
+            <a:r>
+              <a:rPr lang="en-CA" dirty="0"/>
+              <a:t>We can also model the relations with age as a quadratic, cubic, …</a:t>
+            </a:r>
+          </a:p>
+        </p:txBody>
+      </p:sp>
+      <p:sp>
+        <p:nvSpPr>
+          <p:cNvPr id="7" name="TextBox 6">
+            <a:extLst>
+              <a:ext uri="{FF2B5EF4-FFF2-40B4-BE49-F238E27FC236}">
+                <a16:creationId xmlns:a16="http://schemas.microsoft.com/office/drawing/2014/main" id="{3EF1C720-A2BB-3348-DBFD-F112102BB9BB}"/>
+              </a:ext>
+            </a:extLst>
+          </p:cNvPr>
+          <p:cNvSpPr txBox="1"/>
+          <p:nvPr/>
+        </p:nvSpPr>
+        <p:spPr>
+          <a:xfrm>
+            <a:off x="533400" y="2743200"/>
+            <a:ext cx="8153400" cy="369332"/>
+          </a:xfrm>
+          <a:prstGeom prst="rect">
+            <a:avLst/>
+          </a:prstGeom>
+          <a:noFill/>
+        </p:spPr>
+        <p:txBody>
+          <a:bodyPr wrap="square" rtlCol="0">
+            <a:spAutoFit/>
+          </a:bodyPr>
+          <a:lstStyle/>
+          <a:p>
+            <a:r>
+              <a:rPr lang="en-CA" dirty="0"/>
+              <a:t>VGAM also implements vector generalized additive models, fit using </a:t>
+            </a:r>
+            <a:r>
+              <a:rPr lang="en-CA" dirty="0" err="1"/>
+              <a:t>vgam</a:t>
+            </a:r>
+            <a:r>
+              <a:rPr lang="en-CA" dirty="0"/>
+              <a:t>()</a:t>
+            </a:r>
+          </a:p>
+        </p:txBody>
+      </p:sp>
+    </p:spTree>
+    <p:extLst>
+      <p:ext uri="{BB962C8B-B14F-4D97-AF65-F5344CB8AC3E}">
+        <p14:creationId xmlns:p14="http://schemas.microsoft.com/office/powerpoint/2010/main" val="3102492754"/>
+      </p:ext>
+    </p:extLst>
+  </p:cSld>
+  <p:clrMapOvr>
+    <a:masterClrMapping/>
+  </p:clrMapOvr>
+</p:sld>
+</file>
+
+<file path=ppt/slides/slide48.xml><?xml version="1.0" encoding="utf-8"?>
+<p:sld xmlns:a="http://schemas.openxmlformats.org/drawingml/2006/main" xmlns:r="http://schemas.openxmlformats.org/officeDocument/2006/relationships" xmlns:p="http://schemas.openxmlformats.org/presentationml/2006/main">
+  <p:cSld>
+    <p:spTree>
+      <p:nvGrpSpPr>
+        <p:cNvPr id="1" name=""/>
+        <p:cNvGrpSpPr/>
+        <p:nvPr/>
+      </p:nvGrpSpPr>
+      <p:grpSpPr>
+        <a:xfrm>
+          <a:off x="0" y="0"/>
+          <a:ext cx="0" cy="0"/>
+          <a:chOff x="0" y="0"/>
+          <a:chExt cx="0" cy="0"/>
+        </a:xfrm>
+      </p:grpSpPr>
+      <p:sp>
+        <p:nvSpPr>
+          <p:cNvPr id="2" name="Title 1">
+            <a:extLst>
+              <a:ext uri="{FF2B5EF4-FFF2-40B4-BE49-F238E27FC236}">
                 <a16:creationId xmlns:a16="http://schemas.microsoft.com/office/drawing/2014/main" id="{D0973984-F841-7306-D766-AD2F20C0FF49}"/>
               </a:ext>
             </a:extLst>
@@ -12469,7 +15136,7 @@
           <a:p>
             <a:fld id="{621225AB-15B9-4C79-A121-04D1DC7E2307}" type="slidenum">
               <a:rPr lang="en-US" smtClean="0"/>
-              <a:t>43</a:t>
+              <a:t>48</a:t>
             </a:fld>
             <a:endParaRPr lang="en-US"/>
           </a:p>
@@ -12518,7 +15185,7 @@
 </p:sld>
 </file>
 
-<file path=ppt/slides/slide44.xml><?xml version="1.0" encoding="utf-8"?>
+<file path=ppt/slides/slide49.xml><?xml version="1.0" encoding="utf-8"?>
 <p:sld xmlns:a="http://schemas.openxmlformats.org/drawingml/2006/main" xmlns:r="http://schemas.openxmlformats.org/officeDocument/2006/relationships" xmlns:p="http://schemas.openxmlformats.org/presentationml/2006/main">
   <p:cSld>
     <p:spTree>
@@ -12588,7 +15255,7 @@
           <a:p>
             <a:fld id="{621225AB-15B9-4C79-A121-04D1DC7E2307}" type="slidenum">
               <a:rPr lang="en-US" smtClean="0"/>
-              <a:t>44</a:t>
+              <a:t>49</a:t>
             </a:fld>
             <a:endParaRPr lang="en-US"/>
           </a:p>
@@ -12702,7 +15369,7 @@
 </p:sld>
 </file>
 
-<file path=ppt/slides/slide45.xml><?xml version="1.0" encoding="utf-8"?>
+<file path=ppt/slides/slide5.xml><?xml version="1.0" encoding="utf-8"?>
 <p:sld xmlns:a="http://schemas.openxmlformats.org/drawingml/2006/main" xmlns:r="http://schemas.openxmlformats.org/officeDocument/2006/relationships" xmlns:p="http://schemas.openxmlformats.org/presentationml/2006/main">
   <p:cSld>
     <p:spTree>
@@ -12721,10 +15388,10 @@
       </p:grpSpPr>
       <p:sp>
         <p:nvSpPr>
-          <p:cNvPr id="2" name="Title 1">
-            <a:extLst>
-              <a:ext uri="{FF2B5EF4-FFF2-40B4-BE49-F238E27FC236}">
-                <a16:creationId xmlns:a16="http://schemas.microsoft.com/office/drawing/2014/main" id="{A3731BB6-BE2A-7D4C-BB82-380EB29C9B5F}"/>
+          <p:cNvPr id="5" name="Title 4">
+            <a:extLst>
+              <a:ext uri="{FF2B5EF4-FFF2-40B4-BE49-F238E27FC236}">
+                <a16:creationId xmlns:a16="http://schemas.microsoft.com/office/drawing/2014/main" id="{EE85BC90-1951-EC3E-56FF-54D8BE8977AD}"/>
               </a:ext>
             </a:extLst>
           </p:cNvPr>
@@ -12744,17 +15411,17 @@
           <a:p>
             <a:r>
               <a:rPr lang="en-CA" dirty="0"/>
-              <a:t>Log odds model for attitude</a:t>
-            </a:r>
-          </a:p>
-        </p:txBody>
-      </p:sp>
-      <p:sp>
-        <p:nvSpPr>
-          <p:cNvPr id="3" name="Slide Number Placeholder 2">
-            <a:extLst>
-              <a:ext uri="{FF2B5EF4-FFF2-40B4-BE49-F238E27FC236}">
-                <a16:creationId xmlns:a16="http://schemas.microsoft.com/office/drawing/2014/main" id="{B8953C22-9200-7696-F55D-FC3E28E4EEF2}"/>
+              <a:t>2-way example: Hospital visits</a:t>
+            </a:r>
+          </a:p>
+        </p:txBody>
+      </p:sp>
+      <p:sp>
+        <p:nvSpPr>
+          <p:cNvPr id="4" name="Slide Number Placeholder 3">
+            <a:extLst>
+              <a:ext uri="{FF2B5EF4-FFF2-40B4-BE49-F238E27FC236}">
+                <a16:creationId xmlns:a16="http://schemas.microsoft.com/office/drawing/2014/main" id="{E3F4AF0F-C8F1-42C8-C146-612A8408A0DA}"/>
               </a:ext>
             </a:extLst>
           </p:cNvPr>
@@ -12772,7 +15439,284 @@
           <a:p>
             <a:fld id="{621225AB-15B9-4C79-A121-04D1DC7E2307}" type="slidenum">
               <a:rPr lang="en-US" smtClean="0"/>
-              <a:t>45</a:t>
+              <a:t>5</a:t>
+            </a:fld>
+            <a:endParaRPr lang="en-US"/>
+          </a:p>
+        </p:txBody>
+      </p:sp>
+      <p:pic>
+        <p:nvPicPr>
+          <p:cNvPr id="13" name="Picture 12">
+            <a:extLst>
+              <a:ext uri="{FF2B5EF4-FFF2-40B4-BE49-F238E27FC236}">
+                <a16:creationId xmlns:a16="http://schemas.microsoft.com/office/drawing/2014/main" id="{3D506E47-AC45-F7BA-8EDE-7824789CA04E}"/>
+              </a:ext>
+            </a:extLst>
+          </p:cNvPr>
+          <p:cNvPicPr>
+            <a:picLocks noChangeAspect="1"/>
+          </p:cNvPicPr>
+          <p:nvPr/>
+        </p:nvPicPr>
+        <p:blipFill>
+          <a:blip r:embed="rId2"/>
+          <a:stretch>
+            <a:fillRect/>
+          </a:stretch>
+        </p:blipFill>
+        <p:spPr>
+          <a:xfrm>
+            <a:off x="447675" y="1219200"/>
+            <a:ext cx="8123809" cy="2666667"/>
+          </a:xfrm>
+          <a:prstGeom prst="rect">
+            <a:avLst/>
+          </a:prstGeom>
+        </p:spPr>
+      </p:pic>
+      <p:sp>
+        <p:nvSpPr>
+          <p:cNvPr id="14" name="TextBox 13">
+            <a:extLst>
+              <a:ext uri="{FF2B5EF4-FFF2-40B4-BE49-F238E27FC236}">
+                <a16:creationId xmlns:a16="http://schemas.microsoft.com/office/drawing/2014/main" id="{7017014F-6F4E-D193-1929-67367C481481}"/>
+              </a:ext>
+            </a:extLst>
+          </p:cNvPr>
+          <p:cNvSpPr txBox="1"/>
+          <p:nvPr/>
+        </p:nvSpPr>
+        <p:spPr>
+          <a:xfrm>
+            <a:off x="457200" y="4114800"/>
+            <a:ext cx="8114284" cy="2246769"/>
+          </a:xfrm>
+          <a:prstGeom prst="rect">
+            <a:avLst/>
+          </a:prstGeom>
+          <a:noFill/>
+        </p:spPr>
+        <p:txBody>
+          <a:bodyPr wrap="square" rtlCol="0">
+            <a:spAutoFit/>
+          </a:bodyPr>
+          <a:lstStyle/>
+          <a:p>
+            <a:pPr marL="342900" indent="-342900">
+              <a:buFont typeface="Arial" panose="020B0604020202020204" pitchFamily="34" charset="0"/>
+              <a:buChar char="•"/>
+            </a:pPr>
+            <a:r>
+              <a:rPr lang="en-CA" sz="2000" dirty="0"/>
+              <a:t>Length of stay is the response, and it is </a:t>
+            </a:r>
+            <a:r>
+              <a:rPr lang="en-CA" sz="2000" dirty="0">
+                <a:solidFill>
+                  <a:srgbClr val="0070C0"/>
+                </a:solidFill>
+              </a:rPr>
+              <a:t>ordered</a:t>
+            </a:r>
+          </a:p>
+          <a:p>
+            <a:pPr marL="342900" indent="-342900">
+              <a:buFont typeface="Arial" panose="020B0604020202020204" pitchFamily="34" charset="0"/>
+              <a:buChar char="•"/>
+            </a:pPr>
+            <a:r>
+              <a:rPr lang="en-CA" sz="2000" dirty="0"/>
+              <a:t>Can model the </a:t>
+            </a:r>
+            <a:r>
+              <a:rPr lang="en-CA" sz="2000" dirty="0">
+                <a:solidFill>
+                  <a:srgbClr val="0070C0"/>
+                </a:solidFill>
+              </a:rPr>
+              <a:t>adjacent</a:t>
+            </a:r>
+            <a:r>
+              <a:rPr lang="en-CA" sz="2000" dirty="0"/>
+              <a:t> odds or log odds that stay is category j vs (j+1)</a:t>
+            </a:r>
+          </a:p>
+          <a:p>
+            <a:pPr marL="800100" lvl="1" indent="-342900">
+              <a:buFont typeface="Arial" panose="020B0604020202020204" pitchFamily="34" charset="0"/>
+              <a:buChar char="•"/>
+            </a:pPr>
+            <a:r>
+              <a:rPr lang="en-CA" sz="2000" dirty="0"/>
+              <a:t>E.g., stay= 2-9 vs. 10-19;  stay= 10-19 vs. 20+</a:t>
+            </a:r>
+          </a:p>
+          <a:p>
+            <a:pPr marL="342900" indent="-342900">
+              <a:buFont typeface="Arial" panose="020B0604020202020204" pitchFamily="34" charset="0"/>
+              <a:buChar char="•"/>
+            </a:pPr>
+            <a:endParaRPr lang="en-CA" sz="2000" dirty="0"/>
+          </a:p>
+          <a:p>
+            <a:pPr marL="342900" indent="-342900">
+              <a:buFont typeface="Arial" panose="020B0604020202020204" pitchFamily="34" charset="0"/>
+              <a:buChar char="•"/>
+            </a:pPr>
+            <a:r>
+              <a:rPr lang="en-CA" sz="2000" dirty="0"/>
+              <a:t>In general, </a:t>
+            </a:r>
+            <a:r>
+              <a:rPr lang="en-CA" sz="2000" i="1" dirty="0"/>
+              <a:t>I x J </a:t>
+            </a:r>
+            <a:r>
+              <a:rPr lang="en-CA" sz="2000" dirty="0">
+                <a:sym typeface="Symbol" panose="05050102010706020507" pitchFamily="18" charset="2"/>
+              </a:rPr>
+              <a:t> </a:t>
+            </a:r>
+            <a:r>
+              <a:rPr lang="en-CA" sz="2000" i="1" dirty="0">
+                <a:sym typeface="Symbol" panose="05050102010706020507" pitchFamily="18" charset="2"/>
+              </a:rPr>
+              <a:t>I</a:t>
+            </a:r>
+            <a:r>
+              <a:rPr lang="en-CA" sz="2000" dirty="0">
+                <a:sym typeface="Symbol" panose="05050102010706020507" pitchFamily="18" charset="2"/>
+              </a:rPr>
+              <a:t> x (</a:t>
+            </a:r>
+            <a:r>
+              <a:rPr lang="en-CA" sz="2000" i="1" dirty="0">
+                <a:sym typeface="Symbol" panose="05050102010706020507" pitchFamily="18" charset="2"/>
+              </a:rPr>
+              <a:t>J</a:t>
+            </a:r>
+            <a:r>
+              <a:rPr lang="en-CA" sz="2000" dirty="0">
+                <a:sym typeface="Symbol" panose="05050102010706020507" pitchFamily="18" charset="2"/>
+              </a:rPr>
+              <a:t>-1) adjacent comparisons</a:t>
+            </a:r>
+          </a:p>
+          <a:p>
+            <a:pPr marL="342900" indent="-342900">
+              <a:buFont typeface="Arial" panose="020B0604020202020204" pitchFamily="34" charset="0"/>
+              <a:buChar char="•"/>
+            </a:pPr>
+            <a:r>
+              <a:rPr lang="en-CA" sz="2000" dirty="0">
+                <a:sym typeface="Symbol" panose="05050102010706020507" pitchFamily="18" charset="2"/>
+              </a:rPr>
+              <a:t>visit is also </a:t>
+            </a:r>
+            <a:r>
+              <a:rPr lang="en-CA" sz="2000" dirty="0">
+                <a:solidFill>
+                  <a:srgbClr val="0070C0"/>
+                </a:solidFill>
+                <a:sym typeface="Symbol" panose="05050102010706020507" pitchFamily="18" charset="2"/>
+              </a:rPr>
+              <a:t>ordered</a:t>
+            </a:r>
+            <a:r>
+              <a:rPr lang="en-CA" sz="2000" dirty="0">
+                <a:sym typeface="Symbol" panose="05050102010706020507" pitchFamily="18" charset="2"/>
+              </a:rPr>
+              <a:t>. Can consider simpler (e.g., linear) models for the log odds</a:t>
+            </a:r>
+            <a:endParaRPr lang="en-CA" sz="2000" dirty="0"/>
+          </a:p>
+        </p:txBody>
+      </p:sp>
+    </p:spTree>
+    <p:extLst>
+      <p:ext uri="{BB962C8B-B14F-4D97-AF65-F5344CB8AC3E}">
+        <p14:creationId xmlns:p14="http://schemas.microsoft.com/office/powerpoint/2010/main" val="368226058"/>
+      </p:ext>
+    </p:extLst>
+  </p:cSld>
+  <p:clrMapOvr>
+    <a:masterClrMapping/>
+  </p:clrMapOvr>
+</p:sld>
+</file>
+
+<file path=ppt/slides/slide50.xml><?xml version="1.0" encoding="utf-8"?>
+<p:sld xmlns:a="http://schemas.openxmlformats.org/drawingml/2006/main" xmlns:r="http://schemas.openxmlformats.org/officeDocument/2006/relationships" xmlns:p="http://schemas.openxmlformats.org/presentationml/2006/main">
+  <p:cSld>
+    <p:spTree>
+      <p:nvGrpSpPr>
+        <p:cNvPr id="1" name=""/>
+        <p:cNvGrpSpPr/>
+        <p:nvPr/>
+      </p:nvGrpSpPr>
+      <p:grpSpPr>
+        <a:xfrm>
+          <a:off x="0" y="0"/>
+          <a:ext cx="0" cy="0"/>
+          <a:chOff x="0" y="0"/>
+          <a:chExt cx="0" cy="0"/>
+        </a:xfrm>
+      </p:grpSpPr>
+      <p:sp>
+        <p:nvSpPr>
+          <p:cNvPr id="2" name="Title 1">
+            <a:extLst>
+              <a:ext uri="{FF2B5EF4-FFF2-40B4-BE49-F238E27FC236}">
+                <a16:creationId xmlns:a16="http://schemas.microsoft.com/office/drawing/2014/main" id="{A3731BB6-BE2A-7D4C-BB82-380EB29C9B5F}"/>
+              </a:ext>
+            </a:extLst>
+          </p:cNvPr>
+          <p:cNvSpPr>
+            <a:spLocks noGrp="1"/>
+          </p:cNvSpPr>
+          <p:nvPr>
+            <p:ph type="title"/>
+          </p:nvPr>
+        </p:nvSpPr>
+        <p:spPr/>
+        <p:txBody>
+          <a:bodyPr>
+            <a:normAutofit fontScale="90000"/>
+          </a:bodyPr>
+          <a:lstStyle/>
+          <a:p>
+            <a:r>
+              <a:rPr lang="en-CA" dirty="0"/>
+              <a:t>Log odds model for attitude</a:t>
+            </a:r>
+          </a:p>
+        </p:txBody>
+      </p:sp>
+      <p:sp>
+        <p:nvSpPr>
+          <p:cNvPr id="3" name="Slide Number Placeholder 2">
+            <a:extLst>
+              <a:ext uri="{FF2B5EF4-FFF2-40B4-BE49-F238E27FC236}">
+                <a16:creationId xmlns:a16="http://schemas.microsoft.com/office/drawing/2014/main" id="{B8953C22-9200-7696-F55D-FC3E28E4EEF2}"/>
+              </a:ext>
+            </a:extLst>
+          </p:cNvPr>
+          <p:cNvSpPr>
+            <a:spLocks noGrp="1"/>
+          </p:cNvSpPr>
+          <p:nvPr>
+            <p:ph type="sldNum" sz="quarter" idx="12"/>
+          </p:nvPr>
+        </p:nvSpPr>
+        <p:spPr/>
+        <p:txBody>
+          <a:bodyPr/>
+          <a:lstStyle/>
+          <a:p>
+            <a:fld id="{621225AB-15B9-4C79-A121-04D1DC7E2307}" type="slidenum">
+              <a:rPr lang="en-US" smtClean="0"/>
+              <a:t>50</a:t>
             </a:fld>
             <a:endParaRPr lang="en-US"/>
           </a:p>
@@ -12821,7 +15765,7 @@
 </p:sld>
 </file>
 
-<file path=ppt/slides/slide46.xml><?xml version="1.0" encoding="utf-8"?>
+<file path=ppt/slides/slide51.xml><?xml version="1.0" encoding="utf-8"?>
 <p:sld xmlns:a="http://schemas.openxmlformats.org/drawingml/2006/main" xmlns:r="http://schemas.openxmlformats.org/officeDocument/2006/relationships" xmlns:p="http://schemas.openxmlformats.org/presentationml/2006/main">
   <p:cSld>
     <p:spTree>
@@ -12891,7 +15835,7 @@
           <a:p>
             <a:fld id="{621225AB-15B9-4C79-A121-04D1DC7E2307}" type="slidenum">
               <a:rPr lang="en-US" smtClean="0"/>
-              <a:t>46</a:t>
+              <a:t>51</a:t>
             </a:fld>
             <a:endParaRPr lang="en-US"/>
           </a:p>
@@ -12940,7 +15884,7 @@
 </p:sld>
 </file>
 
-<file path=ppt/slides/slide47.xml><?xml version="1.0" encoding="utf-8"?>
+<file path=ppt/slides/slide52.xml><?xml version="1.0" encoding="utf-8"?>
 <p:sld xmlns:a="http://schemas.openxmlformats.org/drawingml/2006/main" xmlns:r="http://schemas.openxmlformats.org/officeDocument/2006/relationships" xmlns:p="http://schemas.openxmlformats.org/presentationml/2006/main">
   <p:cSld>
     <p:spTree>
@@ -13010,7 +15954,7 @@
           <a:p>
             <a:fld id="{621225AB-15B9-4C79-A121-04D1DC7E2307}" type="slidenum">
               <a:rPr lang="en-US" smtClean="0"/>
-              <a:t>47</a:t>
+              <a:t>52</a:t>
             </a:fld>
             <a:endParaRPr lang="en-US"/>
           </a:p>
@@ -13112,7 +16056,7 @@
 </p:sld>
 </file>
 
-<file path=ppt/slides/slide48.xml><?xml version="1.0" encoding="utf-8"?>
+<file path=ppt/slides/slide53.xml><?xml version="1.0" encoding="utf-8"?>
 <p:sld xmlns:a="http://schemas.openxmlformats.org/drawingml/2006/main" xmlns:r="http://schemas.openxmlformats.org/officeDocument/2006/relationships" xmlns:p="http://schemas.openxmlformats.org/presentationml/2006/main">
   <p:cSld>
     <p:spTree>
@@ -13182,7 +16126,7 @@
           <a:p>
             <a:fld id="{621225AB-15B9-4C79-A121-04D1DC7E2307}" type="slidenum">
               <a:rPr lang="en-US" smtClean="0"/>
-              <a:t>48</a:t>
+              <a:t>53</a:t>
             </a:fld>
             <a:endParaRPr lang="en-US"/>
           </a:p>
@@ -13231,7 +16175,7 @@
 </p:sld>
 </file>
 
-<file path=ppt/slides/slide5.xml><?xml version="1.0" encoding="utf-8"?>
+<file path=ppt/slides/slide54.xml><?xml version="1.0" encoding="utf-8"?>
 <p:sld xmlns:a="http://schemas.openxmlformats.org/drawingml/2006/main" xmlns:r="http://schemas.openxmlformats.org/officeDocument/2006/relationships" xmlns:p="http://schemas.openxmlformats.org/presentationml/2006/main">
   <p:cSld>
     <p:spTree>
@@ -13250,10 +16194,10 @@
       </p:grpSpPr>
       <p:sp>
         <p:nvSpPr>
-          <p:cNvPr id="5" name="Title 4">
-            <a:extLst>
-              <a:ext uri="{FF2B5EF4-FFF2-40B4-BE49-F238E27FC236}">
-                <a16:creationId xmlns:a16="http://schemas.microsoft.com/office/drawing/2014/main" id="{EE85BC90-1951-EC3E-56FF-54D8BE8977AD}"/>
+          <p:cNvPr id="2" name="Title 1">
+            <a:extLst>
+              <a:ext uri="{FF2B5EF4-FFF2-40B4-BE49-F238E27FC236}">
+                <a16:creationId xmlns:a16="http://schemas.microsoft.com/office/drawing/2014/main" id="{C5EA4057-DE6B-D8B6-FA96-E87040696B80}"/>
               </a:ext>
             </a:extLst>
           </p:cNvPr>
@@ -13273,17 +16217,104 @@
           <a:p>
             <a:r>
               <a:rPr lang="en-CA" dirty="0"/>
-              <a:t>2-way example: Hospital visits</a:t>
-            </a:r>
-          </a:p>
-        </p:txBody>
-      </p:sp>
-      <p:sp>
-        <p:nvSpPr>
-          <p:cNvPr id="4" name="Slide Number Placeholder 3">
-            <a:extLst>
-              <a:ext uri="{FF2B5EF4-FFF2-40B4-BE49-F238E27FC236}">
-                <a16:creationId xmlns:a16="http://schemas.microsoft.com/office/drawing/2014/main" id="{E3F4AF0F-C8F1-42C8-C146-612A8408A0DA}"/>
+              <a:t>Summary</a:t>
+            </a:r>
+          </a:p>
+        </p:txBody>
+      </p:sp>
+      <p:sp>
+        <p:nvSpPr>
+          <p:cNvPr id="4" name="Content Placeholder 3">
+            <a:extLst>
+              <a:ext uri="{FF2B5EF4-FFF2-40B4-BE49-F238E27FC236}">
+                <a16:creationId xmlns:a16="http://schemas.microsoft.com/office/drawing/2014/main" id="{A8A52713-832F-4B5E-6031-133763E8B891}"/>
+              </a:ext>
+            </a:extLst>
+          </p:cNvPr>
+          <p:cNvSpPr>
+            <a:spLocks noGrp="1"/>
+          </p:cNvSpPr>
+          <p:nvPr>
+            <p:ph idx="1"/>
+          </p:nvPr>
+        </p:nvSpPr>
+        <p:spPr/>
+        <p:txBody>
+          <a:bodyPr/>
+          <a:lstStyle/>
+          <a:p>
+            <a:r>
+              <a:rPr lang="en-CA" dirty="0"/>
+              <a:t>Logit models for a binary response generalize readily to a polytomous response</a:t>
+            </a:r>
+          </a:p>
+          <a:p>
+            <a:pPr lvl="1"/>
+            <a:r>
+              <a:rPr lang="en-CA" dirty="0">
+                <a:sym typeface="Symbol" panose="05050102010706020507" pitchFamily="18" charset="2"/>
+              </a:rPr>
+              <a:t></a:t>
+            </a:r>
+            <a:r>
+              <a:rPr lang="en-CA" dirty="0"/>
+              <a:t>Models for log odds</a:t>
+            </a:r>
+          </a:p>
+          <a:p>
+            <a:pPr lvl="1"/>
+            <a:r>
+              <a:rPr lang="en-CA" dirty="0"/>
+              <a:t>Handles 3+ way table, ordinal variables</a:t>
+            </a:r>
+          </a:p>
+          <a:p>
+            <a:pPr lvl="1"/>
+            <a:r>
+              <a:rPr lang="en-CA" dirty="0"/>
+              <a:t>Simple plots for interpretation</a:t>
+            </a:r>
+          </a:p>
+          <a:p>
+            <a:r>
+              <a:rPr lang="en-CA" dirty="0"/>
+              <a:t>Generalized odds ratios handle bivariate responses</a:t>
+            </a:r>
+          </a:p>
+          <a:p>
+            <a:pPr lvl="1"/>
+            <a:r>
+              <a:rPr lang="en-CA" dirty="0"/>
+              <a:t>Simple linear models for LOR</a:t>
+            </a:r>
+          </a:p>
+          <a:p>
+            <a:pPr lvl="1"/>
+            <a:r>
+              <a:rPr lang="en-CA" dirty="0"/>
+              <a:t>Easy to model log odds for each response and the LOR simultaneously</a:t>
+            </a:r>
+          </a:p>
+          <a:p>
+            <a:pPr lvl="1"/>
+            <a:r>
+              <a:rPr lang="en-CA" dirty="0"/>
+              <a:t>Easy to </a:t>
+            </a:r>
+            <a:r>
+              <a:rPr lang="en-CA"/>
+              <a:t>visualize results</a:t>
+            </a:r>
+            <a:endParaRPr lang="en-CA" dirty="0"/>
+          </a:p>
+        </p:txBody>
+      </p:sp>
+      <p:sp>
+        <p:nvSpPr>
+          <p:cNvPr id="3" name="Slide Number Placeholder 2">
+            <a:extLst>
+              <a:ext uri="{FF2B5EF4-FFF2-40B4-BE49-F238E27FC236}">
+                <a16:creationId xmlns:a16="http://schemas.microsoft.com/office/drawing/2014/main" id="{18349F06-2252-2DCD-A157-50517888F947}"/>
               </a:ext>
             </a:extLst>
           </p:cNvPr>
@@ -13301,204 +16332,16 @@
           <a:p>
             <a:fld id="{621225AB-15B9-4C79-A121-04D1DC7E2307}" type="slidenum">
               <a:rPr lang="en-US" smtClean="0"/>
-              <a:t>5</a:t>
+              <a:t>54</a:t>
             </a:fld>
             <a:endParaRPr lang="en-US"/>
-          </a:p>
-        </p:txBody>
-      </p:sp>
-      <p:pic>
-        <p:nvPicPr>
-          <p:cNvPr id="13" name="Picture 12">
-            <a:extLst>
-              <a:ext uri="{FF2B5EF4-FFF2-40B4-BE49-F238E27FC236}">
-                <a16:creationId xmlns:a16="http://schemas.microsoft.com/office/drawing/2014/main" id="{3D506E47-AC45-F7BA-8EDE-7824789CA04E}"/>
-              </a:ext>
-            </a:extLst>
-          </p:cNvPr>
-          <p:cNvPicPr>
-            <a:picLocks noChangeAspect="1"/>
-          </p:cNvPicPr>
-          <p:nvPr/>
-        </p:nvPicPr>
-        <p:blipFill>
-          <a:blip r:embed="rId2"/>
-          <a:stretch>
-            <a:fillRect/>
-          </a:stretch>
-        </p:blipFill>
-        <p:spPr>
-          <a:xfrm>
-            <a:off x="447675" y="1219200"/>
-            <a:ext cx="8123809" cy="2666667"/>
-          </a:xfrm>
-          <a:prstGeom prst="rect">
-            <a:avLst/>
-          </a:prstGeom>
-        </p:spPr>
-      </p:pic>
-      <p:sp>
-        <p:nvSpPr>
-          <p:cNvPr id="14" name="TextBox 13">
-            <a:extLst>
-              <a:ext uri="{FF2B5EF4-FFF2-40B4-BE49-F238E27FC236}">
-                <a16:creationId xmlns:a16="http://schemas.microsoft.com/office/drawing/2014/main" id="{7017014F-6F4E-D193-1929-67367C481481}"/>
-              </a:ext>
-            </a:extLst>
-          </p:cNvPr>
-          <p:cNvSpPr txBox="1"/>
-          <p:nvPr/>
-        </p:nvSpPr>
-        <p:spPr>
-          <a:xfrm>
-            <a:off x="457200" y="4114800"/>
-            <a:ext cx="8114284" cy="2246769"/>
-          </a:xfrm>
-          <a:prstGeom prst="rect">
-            <a:avLst/>
-          </a:prstGeom>
-          <a:noFill/>
-        </p:spPr>
-        <p:txBody>
-          <a:bodyPr wrap="square" rtlCol="0">
-            <a:spAutoFit/>
-          </a:bodyPr>
-          <a:lstStyle/>
-          <a:p>
-            <a:pPr marL="342900" indent="-342900">
-              <a:buFont typeface="Arial" panose="020B0604020202020204" pitchFamily="34" charset="0"/>
-              <a:buChar char="•"/>
-            </a:pPr>
-            <a:r>
-              <a:rPr lang="en-CA" sz="2000" dirty="0"/>
-              <a:t>Length of stay is the response, and it is </a:t>
-            </a:r>
-            <a:r>
-              <a:rPr lang="en-CA" sz="2000" dirty="0">
-                <a:solidFill>
-                  <a:srgbClr val="0070C0"/>
-                </a:solidFill>
-              </a:rPr>
-              <a:t>ordered</a:t>
-            </a:r>
-          </a:p>
-          <a:p>
-            <a:pPr marL="342900" indent="-342900">
-              <a:buFont typeface="Arial" panose="020B0604020202020204" pitchFamily="34" charset="0"/>
-              <a:buChar char="•"/>
-            </a:pPr>
-            <a:r>
-              <a:rPr lang="en-CA" sz="2000" dirty="0"/>
-              <a:t>Can model the </a:t>
-            </a:r>
-            <a:r>
-              <a:rPr lang="en-CA" sz="2000" dirty="0">
-                <a:solidFill>
-                  <a:srgbClr val="0070C0"/>
-                </a:solidFill>
-              </a:rPr>
-              <a:t>adjacent</a:t>
-            </a:r>
-            <a:r>
-              <a:rPr lang="en-CA" sz="2000" dirty="0"/>
-              <a:t> odds or log odds that stay is category j vs (j+1)</a:t>
-            </a:r>
-          </a:p>
-          <a:p>
-            <a:pPr marL="800100" lvl="1" indent="-342900">
-              <a:buFont typeface="Arial" panose="020B0604020202020204" pitchFamily="34" charset="0"/>
-              <a:buChar char="•"/>
-            </a:pPr>
-            <a:r>
-              <a:rPr lang="en-CA" sz="2000" dirty="0"/>
-              <a:t>E.g., stay= 2-9 vs. 10-19;  stay= 10-19 vs. 20+</a:t>
-            </a:r>
-          </a:p>
-          <a:p>
-            <a:pPr marL="342900" indent="-342900">
-              <a:buFont typeface="Arial" panose="020B0604020202020204" pitchFamily="34" charset="0"/>
-              <a:buChar char="•"/>
-            </a:pPr>
-            <a:endParaRPr lang="en-CA" sz="2000" dirty="0"/>
-          </a:p>
-          <a:p>
-            <a:pPr marL="342900" indent="-342900">
-              <a:buFont typeface="Arial" panose="020B0604020202020204" pitchFamily="34" charset="0"/>
-              <a:buChar char="•"/>
-            </a:pPr>
-            <a:r>
-              <a:rPr lang="en-CA" sz="2000" dirty="0"/>
-              <a:t>In general, </a:t>
-            </a:r>
-            <a:r>
-              <a:rPr lang="en-CA" sz="2000" i="1" dirty="0"/>
-              <a:t>I x J </a:t>
-            </a:r>
-            <a:r>
-              <a:rPr lang="en-CA" sz="2000" dirty="0">
-                <a:sym typeface="Symbol" panose="05050102010706020507" pitchFamily="18" charset="2"/>
-              </a:rPr>
-              <a:t> </a:t>
-            </a:r>
-            <a:r>
-              <a:rPr lang="en-CA" sz="2000" i="1" dirty="0">
-                <a:sym typeface="Symbol" panose="05050102010706020507" pitchFamily="18" charset="2"/>
-              </a:rPr>
-              <a:t>I</a:t>
-            </a:r>
-            <a:r>
-              <a:rPr lang="en-CA" sz="2000" dirty="0">
-                <a:sym typeface="Symbol" panose="05050102010706020507" pitchFamily="18" charset="2"/>
-              </a:rPr>
-              <a:t> x (</a:t>
-            </a:r>
-            <a:r>
-              <a:rPr lang="en-CA" sz="2000" i="1" dirty="0">
-                <a:sym typeface="Symbol" panose="05050102010706020507" pitchFamily="18" charset="2"/>
-              </a:rPr>
-              <a:t>J</a:t>
-            </a:r>
-            <a:r>
-              <a:rPr lang="en-CA" sz="2000" dirty="0">
-                <a:sym typeface="Symbol" panose="05050102010706020507" pitchFamily="18" charset="2"/>
-              </a:rPr>
-              <a:t>-1) adjacent comparisons</a:t>
-            </a:r>
-          </a:p>
-          <a:p>
-            <a:pPr marL="342900" indent="-342900">
-              <a:buFont typeface="Arial" panose="020B0604020202020204" pitchFamily="34" charset="0"/>
-              <a:buChar char="•"/>
-            </a:pPr>
-            <a:r>
-              <a:rPr lang="en-CA" sz="2000" dirty="0">
-                <a:sym typeface="Symbol" panose="05050102010706020507" pitchFamily="18" charset="2"/>
-              </a:rPr>
-              <a:t>visit is also </a:t>
-            </a:r>
-            <a:r>
-              <a:rPr lang="en-CA" sz="2000" dirty="0">
-                <a:solidFill>
-                  <a:srgbClr val="0070C0"/>
-                </a:solidFill>
-                <a:sym typeface="Symbol" panose="05050102010706020507" pitchFamily="18" charset="2"/>
-              </a:rPr>
-              <a:t>ordered</a:t>
-            </a:r>
-            <a:r>
-              <a:rPr lang="en-CA" sz="2000" dirty="0">
-                <a:sym typeface="Symbol" panose="05050102010706020507" pitchFamily="18" charset="2"/>
-              </a:rPr>
-              <a:t>. Can consider simpler (e.g., linear) models for the log odds</a:t>
-            </a:r>
-            <a:endParaRPr lang="en-CA" sz="2000" dirty="0"/>
           </a:p>
         </p:txBody>
       </p:sp>
     </p:spTree>
     <p:extLst>
       <p:ext uri="{BB962C8B-B14F-4D97-AF65-F5344CB8AC3E}">
-        <p14:creationId xmlns:p14="http://schemas.microsoft.com/office/powerpoint/2010/main" val="368226058"/>
+        <p14:creationId xmlns:p14="http://schemas.microsoft.com/office/powerpoint/2010/main" val="2507338528"/>
       </p:ext>
     </p:extLst>
   </p:cSld>

</xml_diff>

<commit_message>
add Udi's table tutorial
</commit_message>
<xml_diff>
--- a/docs/lectures/Log-Odds.pptx
+++ b/docs/lectures/Log-Odds.pptx
@@ -349,7 +349,7 @@
           <a:p>
             <a:fld id="{08BD4FA9-F3CE-45B3-A980-C331C6F1EF65}" type="datetimeFigureOut">
               <a:rPr lang="en-US" smtClean="0"/>
-              <a:t>3/17/2023</a:t>
+              <a:t>3/28/2023</a:t>
             </a:fld>
             <a:endParaRPr lang="en-US"/>
           </a:p>
@@ -622,7 +622,7 @@
           <a:p>
             <a:fld id="{EAAD3657-2200-4D14-82C0-10C39B0F0F06}" type="datetime1">
               <a:rPr lang="en-US" smtClean="0"/>
-              <a:t>3/17/2023</a:t>
+              <a:t>3/28/2023</a:t>
             </a:fld>
             <a:endParaRPr lang="en-US"/>
           </a:p>
@@ -790,7 +790,7 @@
           <a:p>
             <a:fld id="{11BBAF55-A85E-4993-914E-FC1E5AA7DF24}" type="datetime1">
               <a:rPr lang="en-US" smtClean="0"/>
-              <a:t>3/17/2023</a:t>
+              <a:t>3/28/2023</a:t>
             </a:fld>
             <a:endParaRPr lang="en-US"/>
           </a:p>
@@ -968,7 +968,7 @@
           <a:p>
             <a:fld id="{39816E07-E1DB-44A4-A5E5-9F4B54E8C933}" type="datetime1">
               <a:rPr lang="en-US" smtClean="0"/>
-              <a:t>3/17/2023</a:t>
+              <a:t>3/28/2023</a:t>
             </a:fld>
             <a:endParaRPr lang="en-US"/>
           </a:p>
@@ -1153,7 +1153,7 @@
           <a:p>
             <a:fld id="{C2B1AD17-B813-4477-8AFE-B1860CC59113}" type="datetime1">
               <a:rPr lang="en-US" smtClean="0"/>
-              <a:t>3/17/2023</a:t>
+              <a:t>3/28/2023</a:t>
             </a:fld>
             <a:endParaRPr lang="en-US"/>
           </a:p>
@@ -1398,7 +1398,7 @@
           <a:p>
             <a:fld id="{D0975C0D-5C9E-48CC-8D31-F42D19FA8F7A}" type="datetime1">
               <a:rPr lang="en-US" smtClean="0"/>
-              <a:t>3/17/2023</a:t>
+              <a:t>3/28/2023</a:t>
             </a:fld>
             <a:endParaRPr lang="en-US"/>
           </a:p>
@@ -1683,7 +1683,7 @@
           <a:p>
             <a:fld id="{28657551-0F2B-4F09-86FD-F7994CE83DC5}" type="datetime1">
               <a:rPr lang="en-US" smtClean="0"/>
-              <a:t>3/17/2023</a:t>
+              <a:t>3/28/2023</a:t>
             </a:fld>
             <a:endParaRPr lang="en-US"/>
           </a:p>
@@ -2102,7 +2102,7 @@
           <a:p>
             <a:fld id="{3929D2B2-4200-46B9-96C3-02A55D5FAA00}" type="datetime1">
               <a:rPr lang="en-US" smtClean="0"/>
-              <a:t>3/17/2023</a:t>
+              <a:t>3/28/2023</a:t>
             </a:fld>
             <a:endParaRPr lang="en-US"/>
           </a:p>
@@ -2219,7 +2219,7 @@
           <a:p>
             <a:fld id="{41FF7722-74E8-497F-A072-89677A2C2373}" type="datetime1">
               <a:rPr lang="en-US" smtClean="0"/>
-              <a:t>3/17/2023</a:t>
+              <a:t>3/28/2023</a:t>
             </a:fld>
             <a:endParaRPr lang="en-US"/>
           </a:p>
@@ -2314,7 +2314,7 @@
           <a:p>
             <a:fld id="{BD26212E-B46B-426F-AE59-AA326827D9E0}" type="datetime1">
               <a:rPr lang="en-US" smtClean="0"/>
-              <a:t>3/17/2023</a:t>
+              <a:t>3/28/2023</a:t>
             </a:fld>
             <a:endParaRPr lang="en-US"/>
           </a:p>
@@ -2589,7 +2589,7 @@
           <a:p>
             <a:fld id="{FB9B81E8-09EA-4684-A39F-38DE1E49D20C}" type="datetime1">
               <a:rPr lang="en-US" smtClean="0"/>
-              <a:t>3/17/2023</a:t>
+              <a:t>3/28/2023</a:t>
             </a:fld>
             <a:endParaRPr lang="en-US"/>
           </a:p>
@@ -2841,7 +2841,7 @@
           <a:p>
             <a:fld id="{35C5CC5F-056C-4047-9A5C-9F5B4BED129B}" type="datetime1">
               <a:rPr lang="en-US" smtClean="0"/>
-              <a:t>3/17/2023</a:t>
+              <a:t>3/28/2023</a:t>
             </a:fld>
             <a:endParaRPr lang="en-US"/>
           </a:p>
@@ -3055,7 +3055,7 @@
           <a:p>
             <a:fld id="{E8171053-07BD-4A17-AC24-0A22EAA36098}" type="datetime1">
               <a:rPr lang="en-US" smtClean="0"/>
-              <a:t>3/17/2023</a:t>
+              <a:t>3/28/2023</a:t>
             </a:fld>
             <a:endParaRPr lang="en-US"/>
           </a:p>
@@ -9223,6 +9223,42 @@
           </a:prstGeom>
         </p:spPr>
       </p:pic>
+      <p:sp>
+        <p:nvSpPr>
+          <p:cNvPr id="4" name="TextBox 3">
+            <a:extLst>
+              <a:ext uri="{FF2B5EF4-FFF2-40B4-BE49-F238E27FC236}">
+                <a16:creationId xmlns:a16="http://schemas.microsoft.com/office/drawing/2014/main" id="{1A9902BF-CA42-C7E8-930C-07D2676F18AD}"/>
+              </a:ext>
+            </a:extLst>
+          </p:cNvPr>
+          <p:cNvSpPr txBox="1"/>
+          <p:nvPr/>
+        </p:nvSpPr>
+        <p:spPr>
+          <a:xfrm>
+            <a:off x="2438400" y="1600200"/>
+            <a:ext cx="381000" cy="461665"/>
+          </a:xfrm>
+          <a:prstGeom prst="rect">
+            <a:avLst/>
+          </a:prstGeom>
+          <a:noFill/>
+        </p:spPr>
+        <p:txBody>
+          <a:bodyPr wrap="square" rtlCol="0">
+            <a:spAutoFit/>
+          </a:bodyPr>
+          <a:lstStyle/>
+          <a:p>
+            <a:pPr algn="ctr"/>
+            <a:r>
+              <a:rPr lang="en-CA" sz="2400" dirty="0"/>
+              <a:t>~</a:t>
+            </a:r>
+          </a:p>
+        </p:txBody>
+      </p:sp>
     </p:spTree>
     <p:extLst>
       <p:ext uri="{BB962C8B-B14F-4D97-AF65-F5344CB8AC3E}">

</xml_diff>